<commit_message>
Updated Module 11 Formatting
</commit_message>
<xml_diff>
--- a/slides/Module 11 - Objects.pptx
+++ b/slides/Module 11 - Objects.pptx
@@ -2,7 +2,7 @@
 <file path=ppt/presentation.xml><?xml version="1.0" encoding="utf-8"?>
 <p:presentation xmlns:a="http://schemas.openxmlformats.org/drawingml/2006/main" xmlns:r="http://schemas.openxmlformats.org/officeDocument/2006/relationships" xmlns:p="http://schemas.openxmlformats.org/presentationml/2006/main" saveSubsetFonts="1">
   <p:sldMasterIdLst>
-    <p:sldMasterId id="2147483660" r:id="rId1"/>
+    <p:sldMasterId id="2147483672" r:id="rId1"/>
   </p:sldMasterIdLst>
   <p:sldIdLst>
     <p:sldId id="256" r:id="rId2"/>
@@ -56,7 +56,7 @@
     <a:defPPr>
       <a:defRPr lang="en-US"/>
     </a:defPPr>
-    <a:lvl1pPr marL="0" algn="l" defTabSz="457200" rtl="0" eaLnBrk="1" latinLnBrk="0" hangingPunct="1">
+    <a:lvl1pPr marL="0" algn="l" defTabSz="914400" rtl="0" eaLnBrk="1" latinLnBrk="0" hangingPunct="1">
       <a:defRPr sz="1800" kern="1200">
         <a:solidFill>
           <a:schemeClr val="tx1"/>
@@ -66,7 +66,7 @@
         <a:cs typeface="+mn-cs"/>
       </a:defRPr>
     </a:lvl1pPr>
-    <a:lvl2pPr marL="457200" algn="l" defTabSz="457200" rtl="0" eaLnBrk="1" latinLnBrk="0" hangingPunct="1">
+    <a:lvl2pPr marL="457200" algn="l" defTabSz="914400" rtl="0" eaLnBrk="1" latinLnBrk="0" hangingPunct="1">
       <a:defRPr sz="1800" kern="1200">
         <a:solidFill>
           <a:schemeClr val="tx1"/>
@@ -76,7 +76,7 @@
         <a:cs typeface="+mn-cs"/>
       </a:defRPr>
     </a:lvl2pPr>
-    <a:lvl3pPr marL="914400" algn="l" defTabSz="457200" rtl="0" eaLnBrk="1" latinLnBrk="0" hangingPunct="1">
+    <a:lvl3pPr marL="914400" algn="l" defTabSz="914400" rtl="0" eaLnBrk="1" latinLnBrk="0" hangingPunct="1">
       <a:defRPr sz="1800" kern="1200">
         <a:solidFill>
           <a:schemeClr val="tx1"/>
@@ -86,7 +86,7 @@
         <a:cs typeface="+mn-cs"/>
       </a:defRPr>
     </a:lvl3pPr>
-    <a:lvl4pPr marL="1371600" algn="l" defTabSz="457200" rtl="0" eaLnBrk="1" latinLnBrk="0" hangingPunct="1">
+    <a:lvl4pPr marL="1371600" algn="l" defTabSz="914400" rtl="0" eaLnBrk="1" latinLnBrk="0" hangingPunct="1">
       <a:defRPr sz="1800" kern="1200">
         <a:solidFill>
           <a:schemeClr val="tx1"/>
@@ -96,7 +96,7 @@
         <a:cs typeface="+mn-cs"/>
       </a:defRPr>
     </a:lvl4pPr>
-    <a:lvl5pPr marL="1828800" algn="l" defTabSz="457200" rtl="0" eaLnBrk="1" latinLnBrk="0" hangingPunct="1">
+    <a:lvl5pPr marL="1828800" algn="l" defTabSz="914400" rtl="0" eaLnBrk="1" latinLnBrk="0" hangingPunct="1">
       <a:defRPr sz="1800" kern="1200">
         <a:solidFill>
           <a:schemeClr val="tx1"/>
@@ -106,7 +106,7 @@
         <a:cs typeface="+mn-cs"/>
       </a:defRPr>
     </a:lvl5pPr>
-    <a:lvl6pPr marL="2286000" algn="l" defTabSz="457200" rtl="0" eaLnBrk="1" latinLnBrk="0" hangingPunct="1">
+    <a:lvl6pPr marL="2286000" algn="l" defTabSz="914400" rtl="0" eaLnBrk="1" latinLnBrk="0" hangingPunct="1">
       <a:defRPr sz="1800" kern="1200">
         <a:solidFill>
           <a:schemeClr val="tx1"/>
@@ -116,7 +116,7 @@
         <a:cs typeface="+mn-cs"/>
       </a:defRPr>
     </a:lvl6pPr>
-    <a:lvl7pPr marL="2743200" algn="l" defTabSz="457200" rtl="0" eaLnBrk="1" latinLnBrk="0" hangingPunct="1">
+    <a:lvl7pPr marL="2743200" algn="l" defTabSz="914400" rtl="0" eaLnBrk="1" latinLnBrk="0" hangingPunct="1">
       <a:defRPr sz="1800" kern="1200">
         <a:solidFill>
           <a:schemeClr val="tx1"/>
@@ -126,7 +126,7 @@
         <a:cs typeface="+mn-cs"/>
       </a:defRPr>
     </a:lvl7pPr>
-    <a:lvl8pPr marL="3200400" algn="l" defTabSz="457200" rtl="0" eaLnBrk="1" latinLnBrk="0" hangingPunct="1">
+    <a:lvl8pPr marL="3200400" algn="l" defTabSz="914400" rtl="0" eaLnBrk="1" latinLnBrk="0" hangingPunct="1">
       <a:defRPr sz="1800" kern="1200">
         <a:solidFill>
           <a:schemeClr val="tx1"/>
@@ -136,7 +136,7 @@
         <a:cs typeface="+mn-cs"/>
       </a:defRPr>
     </a:lvl8pPr>
-    <a:lvl9pPr marL="3657600" algn="l" defTabSz="457200" rtl="0" eaLnBrk="1" latinLnBrk="0" hangingPunct="1">
+    <a:lvl9pPr marL="3657600" algn="l" defTabSz="914400" rtl="0" eaLnBrk="1" latinLnBrk="0" hangingPunct="1">
       <a:defRPr sz="1800" kern="1200">
         <a:solidFill>
           <a:schemeClr val="tx1"/>
@@ -147,6 +147,11 @@
       </a:defRPr>
     </a:lvl9pPr>
   </p:defaultTextStyle>
+  <p:extLst>
+    <p:ext uri="{EFAFB233-063F-42B5-8137-9DF3F51BA10A}">
+      <p15:sldGuideLst xmlns:p15="http://schemas.microsoft.com/office/powerpoint/2012/main"/>
+    </p:ext>
+  </p:extLst>
 </p:presentation>
 </file>
 
@@ -169,7 +174,13 @@
       </p:grpSpPr>
       <p:sp>
         <p:nvSpPr>
-          <p:cNvPr id="2" name="Title 1"/>
+          <p:cNvPr id="2" name="Title 1">
+            <a:extLst>
+              <a:ext uri="{FF2B5EF4-FFF2-40B4-BE49-F238E27FC236}">
+                <a16:creationId xmlns:a16="http://schemas.microsoft.com/office/drawing/2014/main" id="{330C1EE3-BC80-E97C-35BA-B9F3664F817C}"/>
+              </a:ext>
+            </a:extLst>
+          </p:cNvPr>
           <p:cNvSpPr>
             <a:spLocks noGrp="1"/>
           </p:cNvSpPr>
@@ -179,17 +190,15 @@
         </p:nvSpPr>
         <p:spPr>
           <a:xfrm>
-            <a:off x="2417779" y="802298"/>
-            <a:ext cx="8637073" cy="2541431"/>
+            <a:off x="1524000" y="1122363"/>
+            <a:ext cx="9144000" cy="2387600"/>
           </a:xfrm>
         </p:spPr>
         <p:txBody>
-          <a:bodyPr bIns="0" anchor="b">
-            <a:normAutofit/>
-          </a:bodyPr>
+          <a:bodyPr anchor="b"/>
           <a:lstStyle>
-            <a:lvl1pPr algn="l">
-              <a:defRPr sz="6600"/>
+            <a:lvl1pPr algn="ctr">
+              <a:defRPr sz="6000"/>
             </a:lvl1pPr>
           </a:lstStyle>
           <a:p>
@@ -197,13 +206,18 @@
               <a:rPr lang="en-US"/>
               <a:t>Click to edit Master title style</a:t>
             </a:r>
-            <a:endParaRPr lang="en-US" dirty="0"/>
-          </a:p>
-        </p:txBody>
-      </p:sp>
-      <p:sp>
-        <p:nvSpPr>
-          <p:cNvPr id="3" name="Subtitle 2"/>
+          </a:p>
+        </p:txBody>
+      </p:sp>
+      <p:sp>
+        <p:nvSpPr>
+          <p:cNvPr id="3" name="Subtitle 2">
+            <a:extLst>
+              <a:ext uri="{FF2B5EF4-FFF2-40B4-BE49-F238E27FC236}">
+                <a16:creationId xmlns:a16="http://schemas.microsoft.com/office/drawing/2014/main" id="{13C582AB-185C-FF66-C1DB-8C02AECA2177}"/>
+              </a:ext>
+            </a:extLst>
+          </p:cNvPr>
           <p:cNvSpPr>
             <a:spLocks noGrp="1"/>
           </p:cNvSpPr>
@@ -213,26 +227,20 @@
         </p:nvSpPr>
         <p:spPr>
           <a:xfrm>
-            <a:off x="2417780" y="3531204"/>
-            <a:ext cx="8637072" cy="977621"/>
+            <a:off x="1524000" y="3602038"/>
+            <a:ext cx="9144000" cy="1655762"/>
           </a:xfrm>
         </p:spPr>
         <p:txBody>
-          <a:bodyPr tIns="91440" bIns="91440">
-            <a:normAutofit/>
-          </a:bodyPr>
+          <a:bodyPr/>
           <a:lstStyle>
-            <a:lvl1pPr marL="0" indent="0" algn="l">
+            <a:lvl1pPr marL="0" indent="0" algn="ctr">
               <a:buNone/>
-              <a:defRPr sz="1800" b="0" cap="all" baseline="0">
-                <a:solidFill>
-                  <a:schemeClr val="tx1"/>
-                </a:solidFill>
-              </a:defRPr>
+              <a:defRPr sz="2400"/>
             </a:lvl1pPr>
             <a:lvl2pPr marL="457200" indent="0" algn="ctr">
               <a:buNone/>
-              <a:defRPr sz="1800"/>
+              <a:defRPr sz="2000"/>
             </a:lvl2pPr>
             <a:lvl3pPr marL="914400" indent="0" algn="ctr">
               <a:buNone/>
@@ -268,13 +276,18 @@
               <a:rPr lang="en-US"/>
               <a:t>Click to edit Master subtitle style</a:t>
             </a:r>
-            <a:endParaRPr lang="en-US" dirty="0"/>
-          </a:p>
-        </p:txBody>
-      </p:sp>
-      <p:sp>
-        <p:nvSpPr>
-          <p:cNvPr id="4" name="Date Placeholder 3"/>
+          </a:p>
+        </p:txBody>
+      </p:sp>
+      <p:sp>
+        <p:nvSpPr>
+          <p:cNvPr id="4" name="Date Placeholder 3">
+            <a:extLst>
+              <a:ext uri="{FF2B5EF4-FFF2-40B4-BE49-F238E27FC236}">
+                <a16:creationId xmlns:a16="http://schemas.microsoft.com/office/drawing/2014/main" id="{9DB7E384-3B74-6092-C1A1-D47D27858DE8}"/>
+              </a:ext>
+            </a:extLst>
+          </p:cNvPr>
           <p:cNvSpPr>
             <a:spLocks noGrp="1"/>
           </p:cNvSpPr>
@@ -289,7 +302,7 @@
           <a:p>
             <a:fld id="{0B1E5D5D-8F7B-45A0-991D-D34D0876FD23}" type="datetimeFigureOut">
               <a:rPr lang="en-US" smtClean="0"/>
-              <a:t>4/25/2023</a:t>
+              <a:t>8/23/2023</a:t>
             </a:fld>
             <a:endParaRPr lang="en-US"/>
           </a:p>
@@ -297,7 +310,13 @@
       </p:sp>
       <p:sp>
         <p:nvSpPr>
-          <p:cNvPr id="5" name="Footer Placeholder 4"/>
+          <p:cNvPr id="5" name="Footer Placeholder 4">
+            <a:extLst>
+              <a:ext uri="{FF2B5EF4-FFF2-40B4-BE49-F238E27FC236}">
+                <a16:creationId xmlns:a16="http://schemas.microsoft.com/office/drawing/2014/main" id="{DFE41D60-2BC2-FB9F-2CE3-D644232F6393}"/>
+              </a:ext>
+            </a:extLst>
+          </p:cNvPr>
           <p:cNvSpPr>
             <a:spLocks noGrp="1"/>
           </p:cNvSpPr>
@@ -305,12 +324,7 @@
             <p:ph type="ftr" sz="quarter" idx="11"/>
           </p:nvPr>
         </p:nvSpPr>
-        <p:spPr>
-          <a:xfrm>
-            <a:off x="2416500" y="329307"/>
-            <a:ext cx="4973915" cy="309201"/>
-          </a:xfrm>
-        </p:spPr>
+        <p:spPr/>
         <p:txBody>
           <a:bodyPr/>
           <a:lstStyle/>
@@ -321,7 +335,13 @@
       </p:sp>
       <p:sp>
         <p:nvSpPr>
-          <p:cNvPr id="6" name="Slide Number Placeholder 5"/>
+          <p:cNvPr id="6" name="Slide Number Placeholder 5">
+            <a:extLst>
+              <a:ext uri="{FF2B5EF4-FFF2-40B4-BE49-F238E27FC236}">
+                <a16:creationId xmlns:a16="http://schemas.microsoft.com/office/drawing/2014/main" id="{10FE7DFE-0903-6407-B323-303EFAADA9E6}"/>
+              </a:ext>
+            </a:extLst>
+          </p:cNvPr>
           <p:cNvSpPr>
             <a:spLocks noGrp="1"/>
           </p:cNvSpPr>
@@ -329,12 +349,7 @@
             <p:ph type="sldNum" sz="quarter" idx="12"/>
           </p:nvPr>
         </p:nvSpPr>
-        <p:spPr>
-          <a:xfrm>
-            <a:off x="1437664" y="798973"/>
-            <a:ext cx="811019" cy="503578"/>
-          </a:xfrm>
-        </p:spPr>
+        <p:spPr/>
         <p:txBody>
           <a:bodyPr/>
           <a:lstStyle/>
@@ -347,41 +362,10 @@
           </a:p>
         </p:txBody>
       </p:sp>
-      <p:cxnSp>
-        <p:nvCxnSpPr>
-          <p:cNvPr id="15" name="Straight Connector 14"/>
-          <p:cNvCxnSpPr/>
-          <p:nvPr/>
-        </p:nvCxnSpPr>
-        <p:spPr>
-          <a:xfrm>
-            <a:off x="2417780" y="3528542"/>
-            <a:ext cx="8637072" cy="0"/>
-          </a:xfrm>
-          <a:prstGeom prst="line">
-            <a:avLst/>
-          </a:prstGeom>
-          <a:ln w="31750"/>
-        </p:spPr>
-        <p:style>
-          <a:lnRef idx="3">
-            <a:schemeClr val="accent1"/>
-          </a:lnRef>
-          <a:fillRef idx="0">
-            <a:schemeClr val="accent1"/>
-          </a:fillRef>
-          <a:effectRef idx="2">
-            <a:schemeClr val="accent1"/>
-          </a:effectRef>
-          <a:fontRef idx="minor">
-            <a:schemeClr val="tx1"/>
-          </a:fontRef>
-        </p:style>
-      </p:cxnSp>
     </p:spTree>
     <p:extLst>
       <p:ext uri="{BB962C8B-B14F-4D97-AF65-F5344CB8AC3E}">
-        <p14:creationId xmlns:p14="http://schemas.microsoft.com/office/powerpoint/2010/main" val="3150719161"/>
+        <p14:creationId xmlns:p14="http://schemas.microsoft.com/office/powerpoint/2010/main" val="1236511358"/>
       </p:ext>
     </p:extLst>
   </p:cSld>
@@ -410,7 +394,13 @@
       </p:grpSpPr>
       <p:sp>
         <p:nvSpPr>
-          <p:cNvPr id="2" name="Title 1"/>
+          <p:cNvPr id="2" name="Title 1">
+            <a:extLst>
+              <a:ext uri="{FF2B5EF4-FFF2-40B4-BE49-F238E27FC236}">
+                <a16:creationId xmlns:a16="http://schemas.microsoft.com/office/drawing/2014/main" id="{FE7942E7-BDBB-5081-D62D-02E99047BA30}"/>
+              </a:ext>
+            </a:extLst>
+          </p:cNvPr>
           <p:cNvSpPr>
             <a:spLocks noGrp="1"/>
           </p:cNvSpPr>
@@ -427,13 +417,18 @@
               <a:rPr lang="en-US"/>
               <a:t>Click to edit Master title style</a:t>
             </a:r>
-            <a:endParaRPr lang="en-US" dirty="0"/>
-          </a:p>
-        </p:txBody>
-      </p:sp>
-      <p:sp>
-        <p:nvSpPr>
-          <p:cNvPr id="3" name="Vertical Text Placeholder 2"/>
+          </a:p>
+        </p:txBody>
+      </p:sp>
+      <p:sp>
+        <p:nvSpPr>
+          <p:cNvPr id="3" name="Vertical Text Placeholder 2">
+            <a:extLst>
+              <a:ext uri="{FF2B5EF4-FFF2-40B4-BE49-F238E27FC236}">
+                <a16:creationId xmlns:a16="http://schemas.microsoft.com/office/drawing/2014/main" id="{C00DE101-4DDD-5D22-7236-0AAF6E1309C9}"/>
+              </a:ext>
+            </a:extLst>
+          </p:cNvPr>
           <p:cNvSpPr>
             <a:spLocks noGrp="1"/>
           </p:cNvSpPr>
@@ -479,13 +474,18 @@
               <a:rPr lang="en-US"/>
               <a:t>Fifth level</a:t>
             </a:r>
-            <a:endParaRPr lang="en-US" dirty="0"/>
-          </a:p>
-        </p:txBody>
-      </p:sp>
-      <p:sp>
-        <p:nvSpPr>
-          <p:cNvPr id="4" name="Date Placeholder 3"/>
+          </a:p>
+        </p:txBody>
+      </p:sp>
+      <p:sp>
+        <p:nvSpPr>
+          <p:cNvPr id="4" name="Date Placeholder 3">
+            <a:extLst>
+              <a:ext uri="{FF2B5EF4-FFF2-40B4-BE49-F238E27FC236}">
+                <a16:creationId xmlns:a16="http://schemas.microsoft.com/office/drawing/2014/main" id="{30A67C68-5A7F-F2BB-307C-369E86138D72}"/>
+              </a:ext>
+            </a:extLst>
+          </p:cNvPr>
           <p:cNvSpPr>
             <a:spLocks noGrp="1"/>
           </p:cNvSpPr>
@@ -500,7 +500,7 @@
           <a:p>
             <a:fld id="{0B1E5D5D-8F7B-45A0-991D-D34D0876FD23}" type="datetimeFigureOut">
               <a:rPr lang="en-US" smtClean="0"/>
-              <a:t>4/25/2023</a:t>
+              <a:t>8/23/2023</a:t>
             </a:fld>
             <a:endParaRPr lang="en-US"/>
           </a:p>
@@ -508,7 +508,13 @@
       </p:sp>
       <p:sp>
         <p:nvSpPr>
-          <p:cNvPr id="5" name="Footer Placeholder 4"/>
+          <p:cNvPr id="5" name="Footer Placeholder 4">
+            <a:extLst>
+              <a:ext uri="{FF2B5EF4-FFF2-40B4-BE49-F238E27FC236}">
+                <a16:creationId xmlns:a16="http://schemas.microsoft.com/office/drawing/2014/main" id="{A974E974-EBC5-C479-DB1F-181CC6C4C459}"/>
+              </a:ext>
+            </a:extLst>
+          </p:cNvPr>
           <p:cNvSpPr>
             <a:spLocks noGrp="1"/>
           </p:cNvSpPr>
@@ -527,7 +533,13 @@
       </p:sp>
       <p:sp>
         <p:nvSpPr>
-          <p:cNvPr id="6" name="Slide Number Placeholder 5"/>
+          <p:cNvPr id="6" name="Slide Number Placeholder 5">
+            <a:extLst>
+              <a:ext uri="{FF2B5EF4-FFF2-40B4-BE49-F238E27FC236}">
+                <a16:creationId xmlns:a16="http://schemas.microsoft.com/office/drawing/2014/main" id="{5DA9A8BD-6E03-2649-B8DA-63614333A55D}"/>
+              </a:ext>
+            </a:extLst>
+          </p:cNvPr>
           <p:cNvSpPr>
             <a:spLocks noGrp="1"/>
           </p:cNvSpPr>
@@ -548,41 +560,10 @@
           </a:p>
         </p:txBody>
       </p:sp>
-      <p:cxnSp>
-        <p:nvCxnSpPr>
-          <p:cNvPr id="26" name="Straight Connector 25"/>
-          <p:cNvCxnSpPr/>
-          <p:nvPr/>
-        </p:nvCxnSpPr>
-        <p:spPr>
-          <a:xfrm>
-            <a:off x="1453896" y="1847088"/>
-            <a:ext cx="9607522" cy="0"/>
-          </a:xfrm>
-          <a:prstGeom prst="line">
-            <a:avLst/>
-          </a:prstGeom>
-          <a:ln w="31750"/>
-        </p:spPr>
-        <p:style>
-          <a:lnRef idx="3">
-            <a:schemeClr val="accent1"/>
-          </a:lnRef>
-          <a:fillRef idx="0">
-            <a:schemeClr val="accent1"/>
-          </a:fillRef>
-          <a:effectRef idx="2">
-            <a:schemeClr val="accent1"/>
-          </a:effectRef>
-          <a:fontRef idx="minor">
-            <a:schemeClr val="tx1"/>
-          </a:fontRef>
-        </p:style>
-      </p:cxnSp>
     </p:spTree>
     <p:extLst>
       <p:ext uri="{BB962C8B-B14F-4D97-AF65-F5344CB8AC3E}">
-        <p14:creationId xmlns:p14="http://schemas.microsoft.com/office/powerpoint/2010/main" val="1092236698"/>
+        <p14:creationId xmlns:p14="http://schemas.microsoft.com/office/powerpoint/2010/main" val="3554919515"/>
       </p:ext>
     </p:extLst>
   </p:cSld>
@@ -611,7 +592,13 @@
       </p:grpSpPr>
       <p:sp>
         <p:nvSpPr>
-          <p:cNvPr id="2" name="Vertical Title 1"/>
+          <p:cNvPr id="2" name="Vertical Title 1">
+            <a:extLst>
+              <a:ext uri="{FF2B5EF4-FFF2-40B4-BE49-F238E27FC236}">
+                <a16:creationId xmlns:a16="http://schemas.microsoft.com/office/drawing/2014/main" id="{833A9C23-00F8-72DD-C2A1-0B313BF22589}"/>
+              </a:ext>
+            </a:extLst>
+          </p:cNvPr>
           <p:cNvSpPr>
             <a:spLocks noGrp="1"/>
           </p:cNvSpPr>
@@ -621,29 +608,30 @@
         </p:nvSpPr>
         <p:spPr>
           <a:xfrm>
-            <a:off x="9439111" y="798973"/>
-            <a:ext cx="1615742" cy="4659889"/>
+            <a:off x="8724900" y="365125"/>
+            <a:ext cx="2628900" cy="5811838"/>
           </a:xfrm>
         </p:spPr>
         <p:txBody>
           <a:bodyPr vert="eaVert"/>
-          <a:lstStyle>
-            <a:lvl1pPr algn="l">
-              <a:defRPr/>
-            </a:lvl1pPr>
-          </a:lstStyle>
+          <a:lstStyle/>
           <a:p>
             <a:r>
               <a:rPr lang="en-US"/>
               <a:t>Click to edit Master title style</a:t>
             </a:r>
-            <a:endParaRPr lang="en-US" dirty="0"/>
-          </a:p>
-        </p:txBody>
-      </p:sp>
-      <p:sp>
-        <p:nvSpPr>
-          <p:cNvPr id="3" name="Vertical Text Placeholder 2"/>
+          </a:p>
+        </p:txBody>
+      </p:sp>
+      <p:sp>
+        <p:nvSpPr>
+          <p:cNvPr id="3" name="Vertical Text Placeholder 2">
+            <a:extLst>
+              <a:ext uri="{FF2B5EF4-FFF2-40B4-BE49-F238E27FC236}">
+                <a16:creationId xmlns:a16="http://schemas.microsoft.com/office/drawing/2014/main" id="{437BAD7A-7E59-3F3F-9EA0-BE6260BACE94}"/>
+              </a:ext>
+            </a:extLst>
+          </p:cNvPr>
           <p:cNvSpPr>
             <a:spLocks noGrp="1"/>
           </p:cNvSpPr>
@@ -653,8 +641,8 @@
         </p:nvSpPr>
         <p:spPr>
           <a:xfrm>
-            <a:off x="1444672" y="798973"/>
-            <a:ext cx="7828830" cy="4659889"/>
+            <a:off x="838200" y="365125"/>
+            <a:ext cx="7734300" cy="5811838"/>
           </a:xfrm>
         </p:spPr>
         <p:txBody>
@@ -694,13 +682,18 @@
               <a:rPr lang="en-US"/>
               <a:t>Fifth level</a:t>
             </a:r>
-            <a:endParaRPr lang="en-US" dirty="0"/>
-          </a:p>
-        </p:txBody>
-      </p:sp>
-      <p:sp>
-        <p:nvSpPr>
-          <p:cNvPr id="4" name="Date Placeholder 3"/>
+          </a:p>
+        </p:txBody>
+      </p:sp>
+      <p:sp>
+        <p:nvSpPr>
+          <p:cNvPr id="4" name="Date Placeholder 3">
+            <a:extLst>
+              <a:ext uri="{FF2B5EF4-FFF2-40B4-BE49-F238E27FC236}">
+                <a16:creationId xmlns:a16="http://schemas.microsoft.com/office/drawing/2014/main" id="{7063A1A1-85BD-160D-9880-20339E257F25}"/>
+              </a:ext>
+            </a:extLst>
+          </p:cNvPr>
           <p:cNvSpPr>
             <a:spLocks noGrp="1"/>
           </p:cNvSpPr>
@@ -715,7 +708,7 @@
           <a:p>
             <a:fld id="{0B1E5D5D-8F7B-45A0-991D-D34D0876FD23}" type="datetimeFigureOut">
               <a:rPr lang="en-US" smtClean="0"/>
-              <a:t>4/25/2023</a:t>
+              <a:t>8/23/2023</a:t>
             </a:fld>
             <a:endParaRPr lang="en-US"/>
           </a:p>
@@ -723,7 +716,13 @@
       </p:sp>
       <p:sp>
         <p:nvSpPr>
-          <p:cNvPr id="5" name="Footer Placeholder 4"/>
+          <p:cNvPr id="5" name="Footer Placeholder 4">
+            <a:extLst>
+              <a:ext uri="{FF2B5EF4-FFF2-40B4-BE49-F238E27FC236}">
+                <a16:creationId xmlns:a16="http://schemas.microsoft.com/office/drawing/2014/main" id="{E2144316-D52B-06E7-E66E-10C66E4BF408}"/>
+              </a:ext>
+            </a:extLst>
+          </p:cNvPr>
           <p:cNvSpPr>
             <a:spLocks noGrp="1"/>
           </p:cNvSpPr>
@@ -742,7 +741,13 @@
       </p:sp>
       <p:sp>
         <p:nvSpPr>
-          <p:cNvPr id="6" name="Slide Number Placeholder 5"/>
+          <p:cNvPr id="6" name="Slide Number Placeholder 5">
+            <a:extLst>
+              <a:ext uri="{FF2B5EF4-FFF2-40B4-BE49-F238E27FC236}">
+                <a16:creationId xmlns:a16="http://schemas.microsoft.com/office/drawing/2014/main" id="{04387083-3BA1-A9BD-715F-0B93F801D69E}"/>
+              </a:ext>
+            </a:extLst>
+          </p:cNvPr>
           <p:cNvSpPr>
             <a:spLocks noGrp="1"/>
           </p:cNvSpPr>
@@ -763,41 +768,10 @@
           </a:p>
         </p:txBody>
       </p:sp>
-      <p:cxnSp>
-        <p:nvCxnSpPr>
-          <p:cNvPr id="15" name="Straight Connector 14"/>
-          <p:cNvCxnSpPr/>
-          <p:nvPr/>
-        </p:nvCxnSpPr>
-        <p:spPr>
-          <a:xfrm>
-            <a:off x="9439111" y="798973"/>
-            <a:ext cx="0" cy="4659889"/>
-          </a:xfrm>
-          <a:prstGeom prst="line">
-            <a:avLst/>
-          </a:prstGeom>
-          <a:ln w="31750"/>
-        </p:spPr>
-        <p:style>
-          <a:lnRef idx="3">
-            <a:schemeClr val="accent1"/>
-          </a:lnRef>
-          <a:fillRef idx="0">
-            <a:schemeClr val="accent1"/>
-          </a:fillRef>
-          <a:effectRef idx="2">
-            <a:schemeClr val="accent1"/>
-          </a:effectRef>
-          <a:fontRef idx="minor">
-            <a:schemeClr val="tx1"/>
-          </a:fontRef>
-        </p:style>
-      </p:cxnSp>
     </p:spTree>
     <p:extLst>
       <p:ext uri="{BB962C8B-B14F-4D97-AF65-F5344CB8AC3E}">
-        <p14:creationId xmlns:p14="http://schemas.microsoft.com/office/powerpoint/2010/main" val="4264263872"/>
+        <p14:creationId xmlns:p14="http://schemas.microsoft.com/office/powerpoint/2010/main" val="451840053"/>
       </p:ext>
     </p:extLst>
   </p:cSld>
@@ -826,7 +800,13 @@
       </p:grpSpPr>
       <p:sp>
         <p:nvSpPr>
-          <p:cNvPr id="2" name="Title 1"/>
+          <p:cNvPr id="2" name="Title 1">
+            <a:extLst>
+              <a:ext uri="{FF2B5EF4-FFF2-40B4-BE49-F238E27FC236}">
+                <a16:creationId xmlns:a16="http://schemas.microsoft.com/office/drawing/2014/main" id="{86BE3B60-B126-B422-D121-81C0FFE1984F}"/>
+              </a:ext>
+            </a:extLst>
+          </p:cNvPr>
           <p:cNvSpPr>
             <a:spLocks noGrp="1"/>
           </p:cNvSpPr>
@@ -843,13 +823,18 @@
               <a:rPr lang="en-US"/>
               <a:t>Click to edit Master title style</a:t>
             </a:r>
-            <a:endParaRPr lang="en-US" dirty="0"/>
-          </a:p>
-        </p:txBody>
-      </p:sp>
-      <p:sp>
-        <p:nvSpPr>
-          <p:cNvPr id="3" name="Content Placeholder 2"/>
+          </a:p>
+        </p:txBody>
+      </p:sp>
+      <p:sp>
+        <p:nvSpPr>
+          <p:cNvPr id="3" name="Content Placeholder 2">
+            <a:extLst>
+              <a:ext uri="{FF2B5EF4-FFF2-40B4-BE49-F238E27FC236}">
+                <a16:creationId xmlns:a16="http://schemas.microsoft.com/office/drawing/2014/main" id="{9B8E7EE6-30EC-37FF-E633-24C029AC9BB9}"/>
+              </a:ext>
+            </a:extLst>
+          </p:cNvPr>
           <p:cNvSpPr>
             <a:spLocks noGrp="1"/>
           </p:cNvSpPr>
@@ -859,7 +844,7 @@
         </p:nvSpPr>
         <p:spPr/>
         <p:txBody>
-          <a:bodyPr anchor="t"/>
+          <a:bodyPr/>
           <a:lstStyle/>
           <a:p>
             <a:pPr lvl="0"/>
@@ -895,13 +880,18 @@
               <a:rPr lang="en-US"/>
               <a:t>Fifth level</a:t>
             </a:r>
-            <a:endParaRPr lang="en-US" dirty="0"/>
-          </a:p>
-        </p:txBody>
-      </p:sp>
-      <p:sp>
-        <p:nvSpPr>
-          <p:cNvPr id="4" name="Date Placeholder 3"/>
+          </a:p>
+        </p:txBody>
+      </p:sp>
+      <p:sp>
+        <p:nvSpPr>
+          <p:cNvPr id="4" name="Date Placeholder 3">
+            <a:extLst>
+              <a:ext uri="{FF2B5EF4-FFF2-40B4-BE49-F238E27FC236}">
+                <a16:creationId xmlns:a16="http://schemas.microsoft.com/office/drawing/2014/main" id="{913B54EB-BBD1-2DC6-F9A3-F08D2A04EE51}"/>
+              </a:ext>
+            </a:extLst>
+          </p:cNvPr>
           <p:cNvSpPr>
             <a:spLocks noGrp="1"/>
           </p:cNvSpPr>
@@ -916,7 +906,7 @@
           <a:p>
             <a:fld id="{0B1E5D5D-8F7B-45A0-991D-D34D0876FD23}" type="datetimeFigureOut">
               <a:rPr lang="en-US" smtClean="0"/>
-              <a:t>4/25/2023</a:t>
+              <a:t>8/23/2023</a:t>
             </a:fld>
             <a:endParaRPr lang="en-US"/>
           </a:p>
@@ -924,7 +914,13 @@
       </p:sp>
       <p:sp>
         <p:nvSpPr>
-          <p:cNvPr id="5" name="Footer Placeholder 4"/>
+          <p:cNvPr id="5" name="Footer Placeholder 4">
+            <a:extLst>
+              <a:ext uri="{FF2B5EF4-FFF2-40B4-BE49-F238E27FC236}">
+                <a16:creationId xmlns:a16="http://schemas.microsoft.com/office/drawing/2014/main" id="{698063FA-F48B-6D8F-5BA5-CC0512558763}"/>
+              </a:ext>
+            </a:extLst>
+          </p:cNvPr>
           <p:cNvSpPr>
             <a:spLocks noGrp="1"/>
           </p:cNvSpPr>
@@ -943,7 +939,13 @@
       </p:sp>
       <p:sp>
         <p:nvSpPr>
-          <p:cNvPr id="6" name="Slide Number Placeholder 5"/>
+          <p:cNvPr id="6" name="Slide Number Placeholder 5">
+            <a:extLst>
+              <a:ext uri="{FF2B5EF4-FFF2-40B4-BE49-F238E27FC236}">
+                <a16:creationId xmlns:a16="http://schemas.microsoft.com/office/drawing/2014/main" id="{41899472-43FB-1CF0-3DEC-FF1C123D6AA5}"/>
+              </a:ext>
+            </a:extLst>
+          </p:cNvPr>
           <p:cNvSpPr>
             <a:spLocks noGrp="1"/>
           </p:cNvSpPr>
@@ -964,41 +966,10 @@
           </a:p>
         </p:txBody>
       </p:sp>
-      <p:cxnSp>
-        <p:nvCxnSpPr>
-          <p:cNvPr id="33" name="Straight Connector 32"/>
-          <p:cNvCxnSpPr/>
-          <p:nvPr/>
-        </p:nvCxnSpPr>
-        <p:spPr>
-          <a:xfrm>
-            <a:off x="1453896" y="1847088"/>
-            <a:ext cx="9607522" cy="0"/>
-          </a:xfrm>
-          <a:prstGeom prst="line">
-            <a:avLst/>
-          </a:prstGeom>
-          <a:ln w="31750"/>
-        </p:spPr>
-        <p:style>
-          <a:lnRef idx="3">
-            <a:schemeClr val="accent1"/>
-          </a:lnRef>
-          <a:fillRef idx="0">
-            <a:schemeClr val="accent1"/>
-          </a:fillRef>
-          <a:effectRef idx="2">
-            <a:schemeClr val="accent1"/>
-          </a:effectRef>
-          <a:fontRef idx="minor">
-            <a:schemeClr val="tx1"/>
-          </a:fontRef>
-        </p:style>
-      </p:cxnSp>
     </p:spTree>
     <p:extLst>
       <p:ext uri="{BB962C8B-B14F-4D97-AF65-F5344CB8AC3E}">
-        <p14:creationId xmlns:p14="http://schemas.microsoft.com/office/powerpoint/2010/main" val="773873616"/>
+        <p14:creationId xmlns:p14="http://schemas.microsoft.com/office/powerpoint/2010/main" val="4156359467"/>
       </p:ext>
     </p:extLst>
   </p:cSld>
@@ -1027,7 +998,13 @@
       </p:grpSpPr>
       <p:sp>
         <p:nvSpPr>
-          <p:cNvPr id="2" name="Title 1"/>
+          <p:cNvPr id="2" name="Title 1">
+            <a:extLst>
+              <a:ext uri="{FF2B5EF4-FFF2-40B4-BE49-F238E27FC236}">
+                <a16:creationId xmlns:a16="http://schemas.microsoft.com/office/drawing/2014/main" id="{68FCDEE4-6946-BE35-F04B-E9FB7052DDE3}"/>
+              </a:ext>
+            </a:extLst>
+          </p:cNvPr>
           <p:cNvSpPr>
             <a:spLocks noGrp="1"/>
           </p:cNvSpPr>
@@ -1037,17 +1014,15 @@
         </p:nvSpPr>
         <p:spPr>
           <a:xfrm>
-            <a:off x="1454239" y="1756130"/>
-            <a:ext cx="8643154" cy="1887950"/>
+            <a:off x="831850" y="1709738"/>
+            <a:ext cx="10515600" cy="2852737"/>
           </a:xfrm>
         </p:spPr>
         <p:txBody>
-          <a:bodyPr anchor="b">
-            <a:normAutofit/>
-          </a:bodyPr>
+          <a:bodyPr anchor="b"/>
           <a:lstStyle>
-            <a:lvl1pPr algn="l">
-              <a:defRPr sz="3600"/>
+            <a:lvl1pPr>
+              <a:defRPr sz="6000"/>
             </a:lvl1pPr>
           </a:lstStyle>
           <a:p>
@@ -1055,13 +1030,18 @@
               <a:rPr lang="en-US"/>
               <a:t>Click to edit Master title style</a:t>
             </a:r>
-            <a:endParaRPr lang="en-US" dirty="0"/>
-          </a:p>
-        </p:txBody>
-      </p:sp>
-      <p:sp>
-        <p:nvSpPr>
-          <p:cNvPr id="3" name="Text Placeholder 2"/>
+          </a:p>
+        </p:txBody>
+      </p:sp>
+      <p:sp>
+        <p:nvSpPr>
+          <p:cNvPr id="3" name="Text Placeholder 2">
+            <a:extLst>
+              <a:ext uri="{FF2B5EF4-FFF2-40B4-BE49-F238E27FC236}">
+                <a16:creationId xmlns:a16="http://schemas.microsoft.com/office/drawing/2014/main" id="{467759E6-D3AE-EA91-04CE-F6292D2C833C}"/>
+              </a:ext>
+            </a:extLst>
+          </p:cNvPr>
           <p:cNvSpPr>
             <a:spLocks noGrp="1"/>
           </p:cNvSpPr>
@@ -1071,26 +1051,26 @@
         </p:nvSpPr>
         <p:spPr>
           <a:xfrm>
-            <a:off x="1454239" y="3806195"/>
-            <a:ext cx="8630446" cy="1012929"/>
+            <a:off x="831850" y="4589463"/>
+            <a:ext cx="10515600" cy="1500187"/>
           </a:xfrm>
         </p:spPr>
         <p:txBody>
-          <a:bodyPr tIns="91440">
-            <a:normAutofit/>
-          </a:bodyPr>
+          <a:bodyPr/>
           <a:lstStyle>
-            <a:lvl1pPr marL="0" indent="0" algn="l">
+            <a:lvl1pPr marL="0" indent="0">
               <a:buNone/>
-              <a:defRPr sz="1800">
+              <a:defRPr sz="2400">
                 <a:solidFill>
-                  <a:schemeClr val="tx1"/>
+                  <a:schemeClr val="tx1">
+                    <a:tint val="75000"/>
+                  </a:schemeClr>
                 </a:solidFill>
               </a:defRPr>
             </a:lvl1pPr>
             <a:lvl2pPr marL="457200" indent="0">
               <a:buNone/>
-              <a:defRPr sz="1800">
+              <a:defRPr sz="2000">
                 <a:solidFill>
                   <a:schemeClr val="tx1">
                     <a:tint val="75000"/>
@@ -1180,7 +1160,13 @@
       </p:sp>
       <p:sp>
         <p:nvSpPr>
-          <p:cNvPr id="4" name="Date Placeholder 3"/>
+          <p:cNvPr id="4" name="Date Placeholder 3">
+            <a:extLst>
+              <a:ext uri="{FF2B5EF4-FFF2-40B4-BE49-F238E27FC236}">
+                <a16:creationId xmlns:a16="http://schemas.microsoft.com/office/drawing/2014/main" id="{EFB613BC-5E4A-1C94-0753-CFD146FA874E}"/>
+              </a:ext>
+            </a:extLst>
+          </p:cNvPr>
           <p:cNvSpPr>
             <a:spLocks noGrp="1"/>
           </p:cNvSpPr>
@@ -1195,7 +1181,7 @@
           <a:p>
             <a:fld id="{0B1E5D5D-8F7B-45A0-991D-D34D0876FD23}" type="datetimeFigureOut">
               <a:rPr lang="en-US" smtClean="0"/>
-              <a:t>4/25/2023</a:t>
+              <a:t>8/23/2023</a:t>
             </a:fld>
             <a:endParaRPr lang="en-US"/>
           </a:p>
@@ -1203,7 +1189,13 @@
       </p:sp>
       <p:sp>
         <p:nvSpPr>
-          <p:cNvPr id="5" name="Footer Placeholder 4"/>
+          <p:cNvPr id="5" name="Footer Placeholder 4">
+            <a:extLst>
+              <a:ext uri="{FF2B5EF4-FFF2-40B4-BE49-F238E27FC236}">
+                <a16:creationId xmlns:a16="http://schemas.microsoft.com/office/drawing/2014/main" id="{3FEB766A-89BF-4D7C-C989-4C0CD9D7CA89}"/>
+              </a:ext>
+            </a:extLst>
+          </p:cNvPr>
           <p:cNvSpPr>
             <a:spLocks noGrp="1"/>
           </p:cNvSpPr>
@@ -1222,7 +1214,13 @@
       </p:sp>
       <p:sp>
         <p:nvSpPr>
-          <p:cNvPr id="6" name="Slide Number Placeholder 5"/>
+          <p:cNvPr id="6" name="Slide Number Placeholder 5">
+            <a:extLst>
+              <a:ext uri="{FF2B5EF4-FFF2-40B4-BE49-F238E27FC236}">
+                <a16:creationId xmlns:a16="http://schemas.microsoft.com/office/drawing/2014/main" id="{0BF99D0B-BE9B-E530-668B-DB554D18F4BE}"/>
+              </a:ext>
+            </a:extLst>
+          </p:cNvPr>
           <p:cNvSpPr>
             <a:spLocks noGrp="1"/>
           </p:cNvSpPr>
@@ -1243,41 +1241,10 @@
           </a:p>
         </p:txBody>
       </p:sp>
-      <p:cxnSp>
-        <p:nvCxnSpPr>
-          <p:cNvPr id="15" name="Straight Connector 14"/>
-          <p:cNvCxnSpPr/>
-          <p:nvPr/>
-        </p:nvCxnSpPr>
-        <p:spPr>
-          <a:xfrm>
-            <a:off x="1454239" y="3804985"/>
-            <a:ext cx="8630446" cy="0"/>
-          </a:xfrm>
-          <a:prstGeom prst="line">
-            <a:avLst/>
-          </a:prstGeom>
-          <a:ln w="31750"/>
-        </p:spPr>
-        <p:style>
-          <a:lnRef idx="3">
-            <a:schemeClr val="accent1"/>
-          </a:lnRef>
-          <a:fillRef idx="0">
-            <a:schemeClr val="accent1"/>
-          </a:fillRef>
-          <a:effectRef idx="2">
-            <a:schemeClr val="accent1"/>
-          </a:effectRef>
-          <a:fontRef idx="minor">
-            <a:schemeClr val="tx1"/>
-          </a:fontRef>
-        </p:style>
-      </p:cxnSp>
     </p:spTree>
     <p:extLst>
       <p:ext uri="{BB962C8B-B14F-4D97-AF65-F5344CB8AC3E}">
-        <p14:creationId xmlns:p14="http://schemas.microsoft.com/office/powerpoint/2010/main" val="4058191389"/>
+        <p14:creationId xmlns:p14="http://schemas.microsoft.com/office/powerpoint/2010/main" val="2126708973"/>
       </p:ext>
     </p:extLst>
   </p:cSld>
@@ -1306,46 +1273,114 @@
       </p:grpSpPr>
       <p:sp>
         <p:nvSpPr>
-          <p:cNvPr id="2" name="Title 1"/>
+          <p:cNvPr id="2" name="Title 1">
+            <a:extLst>
+              <a:ext uri="{FF2B5EF4-FFF2-40B4-BE49-F238E27FC236}">
+                <a16:creationId xmlns:a16="http://schemas.microsoft.com/office/drawing/2014/main" id="{75D737B6-F396-B2AD-6B98-465377B830AF}"/>
+              </a:ext>
+            </a:extLst>
+          </p:cNvPr>
           <p:cNvSpPr>
             <a:spLocks noGrp="1"/>
           </p:cNvSpPr>
           <p:nvPr>
             <p:ph type="title"/>
+          </p:nvPr>
+        </p:nvSpPr>
+        <p:spPr/>
+        <p:txBody>
+          <a:bodyPr/>
+          <a:lstStyle/>
+          <a:p>
+            <a:r>
+              <a:rPr lang="en-US"/>
+              <a:t>Click to edit Master title style</a:t>
+            </a:r>
+          </a:p>
+        </p:txBody>
+      </p:sp>
+      <p:sp>
+        <p:nvSpPr>
+          <p:cNvPr id="3" name="Content Placeholder 2">
+            <a:extLst>
+              <a:ext uri="{FF2B5EF4-FFF2-40B4-BE49-F238E27FC236}">
+                <a16:creationId xmlns:a16="http://schemas.microsoft.com/office/drawing/2014/main" id="{7C4E6870-07E9-D317-B0A0-25AC3CDE9BA9}"/>
+              </a:ext>
+            </a:extLst>
+          </p:cNvPr>
+          <p:cNvSpPr>
+            <a:spLocks noGrp="1"/>
+          </p:cNvSpPr>
+          <p:nvPr>
+            <p:ph sz="half" idx="1"/>
           </p:nvPr>
         </p:nvSpPr>
         <p:spPr>
           <a:xfrm>
-            <a:off x="1449217" y="804889"/>
-            <a:ext cx="9605635" cy="1059305"/>
+            <a:off x="838200" y="1825625"/>
+            <a:ext cx="5181600" cy="4351338"/>
           </a:xfrm>
         </p:spPr>
         <p:txBody>
           <a:bodyPr/>
           <a:lstStyle/>
           <a:p>
+            <a:pPr lvl="0"/>
             <a:r>
               <a:rPr lang="en-US"/>
-              <a:t>Click to edit Master title style</a:t>
-            </a:r>
-            <a:endParaRPr lang="en-US" dirty="0"/>
-          </a:p>
-        </p:txBody>
-      </p:sp>
-      <p:sp>
-        <p:nvSpPr>
-          <p:cNvPr id="3" name="Content Placeholder 2"/>
-          <p:cNvSpPr>
-            <a:spLocks noGrp="1"/>
-          </p:cNvSpPr>
-          <p:nvPr>
-            <p:ph sz="half" idx="1"/>
+              <a:t>Click to edit Master text styles</a:t>
+            </a:r>
+          </a:p>
+          <a:p>
+            <a:pPr lvl="1"/>
+            <a:r>
+              <a:rPr lang="en-US"/>
+              <a:t>Second level</a:t>
+            </a:r>
+          </a:p>
+          <a:p>
+            <a:pPr lvl="2"/>
+            <a:r>
+              <a:rPr lang="en-US"/>
+              <a:t>Third level</a:t>
+            </a:r>
+          </a:p>
+          <a:p>
+            <a:pPr lvl="3"/>
+            <a:r>
+              <a:rPr lang="en-US"/>
+              <a:t>Fourth level</a:t>
+            </a:r>
+          </a:p>
+          <a:p>
+            <a:pPr lvl="4"/>
+            <a:r>
+              <a:rPr lang="en-US"/>
+              <a:t>Fifth level</a:t>
+            </a:r>
+          </a:p>
+        </p:txBody>
+      </p:sp>
+      <p:sp>
+        <p:nvSpPr>
+          <p:cNvPr id="4" name="Content Placeholder 3">
+            <a:extLst>
+              <a:ext uri="{FF2B5EF4-FFF2-40B4-BE49-F238E27FC236}">
+                <a16:creationId xmlns:a16="http://schemas.microsoft.com/office/drawing/2014/main" id="{3A4EE66A-1167-BB1A-D713-E74252DA9C7F}"/>
+              </a:ext>
+            </a:extLst>
+          </p:cNvPr>
+          <p:cNvSpPr>
+            <a:spLocks noGrp="1"/>
+          </p:cNvSpPr>
+          <p:nvPr>
+            <p:ph sz="half" idx="2"/>
           </p:nvPr>
         </p:nvSpPr>
         <p:spPr>
           <a:xfrm>
-            <a:off x="1447331" y="2010878"/>
-            <a:ext cx="4645152" cy="3448595"/>
+            <a:off x="6172200" y="1825625"/>
+            <a:ext cx="5181600" cy="4351338"/>
           </a:xfrm>
         </p:spPr>
         <p:txBody>
@@ -1385,70 +1420,18 @@
               <a:rPr lang="en-US"/>
               <a:t>Fifth level</a:t>
             </a:r>
-            <a:endParaRPr lang="en-US" dirty="0"/>
-          </a:p>
-        </p:txBody>
-      </p:sp>
-      <p:sp>
-        <p:nvSpPr>
-          <p:cNvPr id="4" name="Content Placeholder 3"/>
-          <p:cNvSpPr>
-            <a:spLocks noGrp="1"/>
-          </p:cNvSpPr>
-          <p:nvPr>
-            <p:ph sz="half" idx="2"/>
-          </p:nvPr>
-        </p:nvSpPr>
-        <p:spPr>
-          <a:xfrm>
-            <a:off x="6413771" y="2017343"/>
-            <a:ext cx="4645152" cy="3441520"/>
-          </a:xfrm>
-        </p:spPr>
-        <p:txBody>
-          <a:bodyPr/>
-          <a:lstStyle/>
-          <a:p>
-            <a:pPr lvl="0"/>
-            <a:r>
-              <a:rPr lang="en-US"/>
-              <a:t>Click to edit Master text styles</a:t>
-            </a:r>
-          </a:p>
-          <a:p>
-            <a:pPr lvl="1"/>
-            <a:r>
-              <a:rPr lang="en-US"/>
-              <a:t>Second level</a:t>
-            </a:r>
-          </a:p>
-          <a:p>
-            <a:pPr lvl="2"/>
-            <a:r>
-              <a:rPr lang="en-US"/>
-              <a:t>Third level</a:t>
-            </a:r>
-          </a:p>
-          <a:p>
-            <a:pPr lvl="3"/>
-            <a:r>
-              <a:rPr lang="en-US"/>
-              <a:t>Fourth level</a:t>
-            </a:r>
-          </a:p>
-          <a:p>
-            <a:pPr lvl="4"/>
-            <a:r>
-              <a:rPr lang="en-US"/>
-              <a:t>Fifth level</a:t>
-            </a:r>
-            <a:endParaRPr lang="en-US" dirty="0"/>
-          </a:p>
-        </p:txBody>
-      </p:sp>
-      <p:sp>
-        <p:nvSpPr>
-          <p:cNvPr id="5" name="Date Placeholder 4"/>
+          </a:p>
+        </p:txBody>
+      </p:sp>
+      <p:sp>
+        <p:nvSpPr>
+          <p:cNvPr id="5" name="Date Placeholder 4">
+            <a:extLst>
+              <a:ext uri="{FF2B5EF4-FFF2-40B4-BE49-F238E27FC236}">
+                <a16:creationId xmlns:a16="http://schemas.microsoft.com/office/drawing/2014/main" id="{E1E1F68B-36B4-7C6A-CB4C-4E28AC3A26F4}"/>
+              </a:ext>
+            </a:extLst>
+          </p:cNvPr>
           <p:cNvSpPr>
             <a:spLocks noGrp="1"/>
           </p:cNvSpPr>
@@ -1463,7 +1446,7 @@
           <a:p>
             <a:fld id="{0B1E5D5D-8F7B-45A0-991D-D34D0876FD23}" type="datetimeFigureOut">
               <a:rPr lang="en-US" smtClean="0"/>
-              <a:t>4/25/2023</a:t>
+              <a:t>8/23/2023</a:t>
             </a:fld>
             <a:endParaRPr lang="en-US"/>
           </a:p>
@@ -1471,7 +1454,13 @@
       </p:sp>
       <p:sp>
         <p:nvSpPr>
-          <p:cNvPr id="6" name="Footer Placeholder 5"/>
+          <p:cNvPr id="6" name="Footer Placeholder 5">
+            <a:extLst>
+              <a:ext uri="{FF2B5EF4-FFF2-40B4-BE49-F238E27FC236}">
+                <a16:creationId xmlns:a16="http://schemas.microsoft.com/office/drawing/2014/main" id="{77C8001C-9456-1534-C54E-B44663223B63}"/>
+              </a:ext>
+            </a:extLst>
+          </p:cNvPr>
           <p:cNvSpPr>
             <a:spLocks noGrp="1"/>
           </p:cNvSpPr>
@@ -1490,7 +1479,13 @@
       </p:sp>
       <p:sp>
         <p:nvSpPr>
-          <p:cNvPr id="7" name="Slide Number Placeholder 6"/>
+          <p:cNvPr id="7" name="Slide Number Placeholder 6">
+            <a:extLst>
+              <a:ext uri="{FF2B5EF4-FFF2-40B4-BE49-F238E27FC236}">
+                <a16:creationId xmlns:a16="http://schemas.microsoft.com/office/drawing/2014/main" id="{BE6079D4-9A9E-770A-3A6A-8A4C509FFFAB}"/>
+              </a:ext>
+            </a:extLst>
+          </p:cNvPr>
           <p:cNvSpPr>
             <a:spLocks noGrp="1"/>
           </p:cNvSpPr>
@@ -1511,41 +1506,10 @@
           </a:p>
         </p:txBody>
       </p:sp>
-      <p:cxnSp>
-        <p:nvCxnSpPr>
-          <p:cNvPr id="35" name="Straight Connector 34"/>
-          <p:cNvCxnSpPr/>
-          <p:nvPr/>
-        </p:nvCxnSpPr>
-        <p:spPr>
-          <a:xfrm>
-            <a:off x="1453896" y="1847088"/>
-            <a:ext cx="9607522" cy="0"/>
-          </a:xfrm>
-          <a:prstGeom prst="line">
-            <a:avLst/>
-          </a:prstGeom>
-          <a:ln w="31750"/>
-        </p:spPr>
-        <p:style>
-          <a:lnRef idx="3">
-            <a:schemeClr val="accent1"/>
-          </a:lnRef>
-          <a:fillRef idx="0">
-            <a:schemeClr val="accent1"/>
-          </a:fillRef>
-          <a:effectRef idx="2">
-            <a:schemeClr val="accent1"/>
-          </a:effectRef>
-          <a:fontRef idx="minor">
-            <a:schemeClr val="tx1"/>
-          </a:fontRef>
-        </p:style>
-      </p:cxnSp>
     </p:spTree>
     <p:extLst>
       <p:ext uri="{BB962C8B-B14F-4D97-AF65-F5344CB8AC3E}">
-        <p14:creationId xmlns:p14="http://schemas.microsoft.com/office/powerpoint/2010/main" val="3753682825"/>
+        <p14:creationId xmlns:p14="http://schemas.microsoft.com/office/powerpoint/2010/main" val="925336843"/>
       </p:ext>
     </p:extLst>
   </p:cSld>
@@ -1574,7 +1538,13 @@
       </p:grpSpPr>
       <p:sp>
         <p:nvSpPr>
-          <p:cNvPr id="2" name="Title 1"/>
+          <p:cNvPr id="2" name="Title 1">
+            <a:extLst>
+              <a:ext uri="{FF2B5EF4-FFF2-40B4-BE49-F238E27FC236}">
+                <a16:creationId xmlns:a16="http://schemas.microsoft.com/office/drawing/2014/main" id="{3BFC997D-492B-5C98-9DFA-0CD4F3AB2F16}"/>
+              </a:ext>
+            </a:extLst>
+          </p:cNvPr>
           <p:cNvSpPr>
             <a:spLocks noGrp="1"/>
           </p:cNvSpPr>
@@ -1584,8 +1554,8 @@
         </p:nvSpPr>
         <p:spPr>
           <a:xfrm>
-            <a:off x="1447191" y="804163"/>
-            <a:ext cx="9607661" cy="1056319"/>
+            <a:off x="839788" y="365125"/>
+            <a:ext cx="10515600" cy="1325563"/>
           </a:xfrm>
         </p:spPr>
         <p:txBody>
@@ -1596,13 +1566,18 @@
               <a:rPr lang="en-US"/>
               <a:t>Click to edit Master title style</a:t>
             </a:r>
-            <a:endParaRPr lang="en-US" dirty="0"/>
-          </a:p>
-        </p:txBody>
-      </p:sp>
-      <p:sp>
-        <p:nvSpPr>
-          <p:cNvPr id="3" name="Text Placeholder 2"/>
+          </a:p>
+        </p:txBody>
+      </p:sp>
+      <p:sp>
+        <p:nvSpPr>
+          <p:cNvPr id="3" name="Text Placeholder 2">
+            <a:extLst>
+              <a:ext uri="{FF2B5EF4-FFF2-40B4-BE49-F238E27FC236}">
+                <a16:creationId xmlns:a16="http://schemas.microsoft.com/office/drawing/2014/main" id="{0B2E9C6F-DFCF-A30B-2FBA-041FF4B593FB}"/>
+              </a:ext>
+            </a:extLst>
+          </p:cNvPr>
           <p:cNvSpPr>
             <a:spLocks noGrp="1"/>
           </p:cNvSpPr>
@@ -1612,25 +1587,16 @@
         </p:nvSpPr>
         <p:spPr>
           <a:xfrm>
-            <a:off x="1447191" y="2019549"/>
-            <a:ext cx="4645152" cy="801943"/>
+            <a:off x="839788" y="1681163"/>
+            <a:ext cx="5157787" cy="823912"/>
           </a:xfrm>
         </p:spPr>
         <p:txBody>
-          <a:bodyPr anchor="b">
-            <a:normAutofit/>
-          </a:bodyPr>
+          <a:bodyPr anchor="b"/>
           <a:lstStyle>
             <a:lvl1pPr marL="0" indent="0">
-              <a:lnSpc>
-                <a:spcPct val="100000"/>
-              </a:lnSpc>
               <a:buNone/>
-              <a:defRPr sz="2200" b="0" cap="all" baseline="0">
-                <a:solidFill>
-                  <a:schemeClr val="accent1"/>
-                </a:solidFill>
-              </a:defRPr>
+              <a:defRPr sz="2400" b="1"/>
             </a:lvl1pPr>
             <a:lvl2pPr marL="457200" indent="0">
               <a:buNone/>
@@ -1676,7 +1642,13 @@
       </p:sp>
       <p:sp>
         <p:nvSpPr>
-          <p:cNvPr id="4" name="Content Placeholder 3"/>
+          <p:cNvPr id="4" name="Content Placeholder 3">
+            <a:extLst>
+              <a:ext uri="{FF2B5EF4-FFF2-40B4-BE49-F238E27FC236}">
+                <a16:creationId xmlns:a16="http://schemas.microsoft.com/office/drawing/2014/main" id="{1D63055F-1083-057D-E564-F844C51BB073}"/>
+              </a:ext>
+            </a:extLst>
+          </p:cNvPr>
           <p:cNvSpPr>
             <a:spLocks noGrp="1"/>
           </p:cNvSpPr>
@@ -1686,8 +1658,8 @@
         </p:nvSpPr>
         <p:spPr>
           <a:xfrm>
-            <a:off x="1447191" y="2824269"/>
-            <a:ext cx="4645152" cy="2644457"/>
+            <a:off x="839788" y="2505075"/>
+            <a:ext cx="5157787" cy="3684588"/>
           </a:xfrm>
         </p:spPr>
         <p:txBody>
@@ -1727,13 +1699,18 @@
               <a:rPr lang="en-US"/>
               <a:t>Fifth level</a:t>
             </a:r>
-            <a:endParaRPr lang="en-US" dirty="0"/>
-          </a:p>
-        </p:txBody>
-      </p:sp>
-      <p:sp>
-        <p:nvSpPr>
-          <p:cNvPr id="5" name="Text Placeholder 4"/>
+          </a:p>
+        </p:txBody>
+      </p:sp>
+      <p:sp>
+        <p:nvSpPr>
+          <p:cNvPr id="5" name="Text Placeholder 4">
+            <a:extLst>
+              <a:ext uri="{FF2B5EF4-FFF2-40B4-BE49-F238E27FC236}">
+                <a16:creationId xmlns:a16="http://schemas.microsoft.com/office/drawing/2014/main" id="{D430CAA8-B5DF-59EF-A9F8-2D8BDB799631}"/>
+              </a:ext>
+            </a:extLst>
+          </p:cNvPr>
           <p:cNvSpPr>
             <a:spLocks noGrp="1"/>
           </p:cNvSpPr>
@@ -1743,25 +1720,16 @@
         </p:nvSpPr>
         <p:spPr>
           <a:xfrm>
-            <a:off x="6412362" y="2023003"/>
-            <a:ext cx="4645152" cy="802237"/>
+            <a:off x="6172200" y="1681163"/>
+            <a:ext cx="5183188" cy="823912"/>
           </a:xfrm>
         </p:spPr>
         <p:txBody>
-          <a:bodyPr anchor="b">
-            <a:normAutofit/>
-          </a:bodyPr>
+          <a:bodyPr anchor="b"/>
           <a:lstStyle>
             <a:lvl1pPr marL="0" indent="0">
-              <a:lnSpc>
-                <a:spcPct val="100000"/>
-              </a:lnSpc>
               <a:buNone/>
-              <a:defRPr sz="2200" b="0" cap="all" baseline="0">
-                <a:solidFill>
-                  <a:schemeClr val="accent1"/>
-                </a:solidFill>
-              </a:defRPr>
+              <a:defRPr sz="2400" b="1"/>
             </a:lvl1pPr>
             <a:lvl2pPr marL="457200" indent="0">
               <a:buNone/>
@@ -1807,7 +1775,13 @@
       </p:sp>
       <p:sp>
         <p:nvSpPr>
-          <p:cNvPr id="6" name="Content Placeholder 5"/>
+          <p:cNvPr id="6" name="Content Placeholder 5">
+            <a:extLst>
+              <a:ext uri="{FF2B5EF4-FFF2-40B4-BE49-F238E27FC236}">
+                <a16:creationId xmlns:a16="http://schemas.microsoft.com/office/drawing/2014/main" id="{C71E3369-FF42-669C-3D3C-F8CCF3D708EA}"/>
+              </a:ext>
+            </a:extLst>
+          </p:cNvPr>
           <p:cNvSpPr>
             <a:spLocks noGrp="1"/>
           </p:cNvSpPr>
@@ -1817,8 +1791,8 @@
         </p:nvSpPr>
         <p:spPr>
           <a:xfrm>
-            <a:off x="6412362" y="2821491"/>
-            <a:ext cx="4645152" cy="2637371"/>
+            <a:off x="6172200" y="2505075"/>
+            <a:ext cx="5183188" cy="3684588"/>
           </a:xfrm>
         </p:spPr>
         <p:txBody>
@@ -1858,13 +1832,18 @@
               <a:rPr lang="en-US"/>
               <a:t>Fifth level</a:t>
             </a:r>
-            <a:endParaRPr lang="en-US" dirty="0"/>
-          </a:p>
-        </p:txBody>
-      </p:sp>
-      <p:sp>
-        <p:nvSpPr>
-          <p:cNvPr id="7" name="Date Placeholder 6"/>
+          </a:p>
+        </p:txBody>
+      </p:sp>
+      <p:sp>
+        <p:nvSpPr>
+          <p:cNvPr id="7" name="Date Placeholder 6">
+            <a:extLst>
+              <a:ext uri="{FF2B5EF4-FFF2-40B4-BE49-F238E27FC236}">
+                <a16:creationId xmlns:a16="http://schemas.microsoft.com/office/drawing/2014/main" id="{181E2A65-5F3B-294E-9B50-97C8FAB6BB82}"/>
+              </a:ext>
+            </a:extLst>
+          </p:cNvPr>
           <p:cNvSpPr>
             <a:spLocks noGrp="1"/>
           </p:cNvSpPr>
@@ -1879,7 +1858,7 @@
           <a:p>
             <a:fld id="{0B1E5D5D-8F7B-45A0-991D-D34D0876FD23}" type="datetimeFigureOut">
               <a:rPr lang="en-US" smtClean="0"/>
-              <a:t>4/25/2023</a:t>
+              <a:t>8/23/2023</a:t>
             </a:fld>
             <a:endParaRPr lang="en-US"/>
           </a:p>
@@ -1887,7 +1866,13 @@
       </p:sp>
       <p:sp>
         <p:nvSpPr>
-          <p:cNvPr id="8" name="Footer Placeholder 7"/>
+          <p:cNvPr id="8" name="Footer Placeholder 7">
+            <a:extLst>
+              <a:ext uri="{FF2B5EF4-FFF2-40B4-BE49-F238E27FC236}">
+                <a16:creationId xmlns:a16="http://schemas.microsoft.com/office/drawing/2014/main" id="{81D8FD75-E8D7-47BB-F447-A788937D9A97}"/>
+              </a:ext>
+            </a:extLst>
+          </p:cNvPr>
           <p:cNvSpPr>
             <a:spLocks noGrp="1"/>
           </p:cNvSpPr>
@@ -1906,7 +1891,13 @@
       </p:sp>
       <p:sp>
         <p:nvSpPr>
-          <p:cNvPr id="9" name="Slide Number Placeholder 8"/>
+          <p:cNvPr id="9" name="Slide Number Placeholder 8">
+            <a:extLst>
+              <a:ext uri="{FF2B5EF4-FFF2-40B4-BE49-F238E27FC236}">
+                <a16:creationId xmlns:a16="http://schemas.microsoft.com/office/drawing/2014/main" id="{FDE9BC0E-8BA0-F91C-7DED-8A53BE6F651D}"/>
+              </a:ext>
+            </a:extLst>
+          </p:cNvPr>
           <p:cNvSpPr>
             <a:spLocks noGrp="1"/>
           </p:cNvSpPr>
@@ -1927,41 +1918,10 @@
           </a:p>
         </p:txBody>
       </p:sp>
-      <p:cxnSp>
-        <p:nvCxnSpPr>
-          <p:cNvPr id="29" name="Straight Connector 28"/>
-          <p:cNvCxnSpPr/>
-          <p:nvPr/>
-        </p:nvCxnSpPr>
-        <p:spPr>
-          <a:xfrm>
-            <a:off x="1453896" y="1847088"/>
-            <a:ext cx="9607522" cy="0"/>
-          </a:xfrm>
-          <a:prstGeom prst="line">
-            <a:avLst/>
-          </a:prstGeom>
-          <a:ln w="31750"/>
-        </p:spPr>
-        <p:style>
-          <a:lnRef idx="3">
-            <a:schemeClr val="accent1"/>
-          </a:lnRef>
-          <a:fillRef idx="0">
-            <a:schemeClr val="accent1"/>
-          </a:fillRef>
-          <a:effectRef idx="2">
-            <a:schemeClr val="accent1"/>
-          </a:effectRef>
-          <a:fontRef idx="minor">
-            <a:schemeClr val="tx1"/>
-          </a:fontRef>
-        </p:style>
-      </p:cxnSp>
     </p:spTree>
     <p:extLst>
       <p:ext uri="{BB962C8B-B14F-4D97-AF65-F5344CB8AC3E}">
-        <p14:creationId xmlns:p14="http://schemas.microsoft.com/office/powerpoint/2010/main" val="3036463393"/>
+        <p14:creationId xmlns:p14="http://schemas.microsoft.com/office/powerpoint/2010/main" val="2762223776"/>
       </p:ext>
     </p:extLst>
   </p:cSld>
@@ -1990,7 +1950,13 @@
       </p:grpSpPr>
       <p:sp>
         <p:nvSpPr>
-          <p:cNvPr id="2" name="Title 1"/>
+          <p:cNvPr id="2" name="Title 1">
+            <a:extLst>
+              <a:ext uri="{FF2B5EF4-FFF2-40B4-BE49-F238E27FC236}">
+                <a16:creationId xmlns:a16="http://schemas.microsoft.com/office/drawing/2014/main" id="{9A9BC313-9220-401D-991C-ADB98B28830D}"/>
+              </a:ext>
+            </a:extLst>
+          </p:cNvPr>
           <p:cNvSpPr>
             <a:spLocks noGrp="1"/>
           </p:cNvSpPr>
@@ -2007,13 +1973,18 @@
               <a:rPr lang="en-US"/>
               <a:t>Click to edit Master title style</a:t>
             </a:r>
-            <a:endParaRPr lang="en-US" dirty="0"/>
-          </a:p>
-        </p:txBody>
-      </p:sp>
-      <p:sp>
-        <p:nvSpPr>
-          <p:cNvPr id="3" name="Date Placeholder 2"/>
+          </a:p>
+        </p:txBody>
+      </p:sp>
+      <p:sp>
+        <p:nvSpPr>
+          <p:cNvPr id="3" name="Date Placeholder 2">
+            <a:extLst>
+              <a:ext uri="{FF2B5EF4-FFF2-40B4-BE49-F238E27FC236}">
+                <a16:creationId xmlns:a16="http://schemas.microsoft.com/office/drawing/2014/main" id="{D85DE4DB-AF7E-8395-4FB0-1C2887D5B91E}"/>
+              </a:ext>
+            </a:extLst>
+          </p:cNvPr>
           <p:cNvSpPr>
             <a:spLocks noGrp="1"/>
           </p:cNvSpPr>
@@ -2028,7 +1999,7 @@
           <a:p>
             <a:fld id="{0B1E5D5D-8F7B-45A0-991D-D34D0876FD23}" type="datetimeFigureOut">
               <a:rPr lang="en-US" smtClean="0"/>
-              <a:t>4/25/2023</a:t>
+              <a:t>8/23/2023</a:t>
             </a:fld>
             <a:endParaRPr lang="en-US"/>
           </a:p>
@@ -2036,7 +2007,13 @@
       </p:sp>
       <p:sp>
         <p:nvSpPr>
-          <p:cNvPr id="4" name="Footer Placeholder 3"/>
+          <p:cNvPr id="4" name="Footer Placeholder 3">
+            <a:extLst>
+              <a:ext uri="{FF2B5EF4-FFF2-40B4-BE49-F238E27FC236}">
+                <a16:creationId xmlns:a16="http://schemas.microsoft.com/office/drawing/2014/main" id="{4A8904C1-AB2F-D295-AEA6-29A19F50B67C}"/>
+              </a:ext>
+            </a:extLst>
+          </p:cNvPr>
           <p:cNvSpPr>
             <a:spLocks noGrp="1"/>
           </p:cNvSpPr>
@@ -2055,7 +2032,13 @@
       </p:sp>
       <p:sp>
         <p:nvSpPr>
-          <p:cNvPr id="5" name="Slide Number Placeholder 4"/>
+          <p:cNvPr id="5" name="Slide Number Placeholder 4">
+            <a:extLst>
+              <a:ext uri="{FF2B5EF4-FFF2-40B4-BE49-F238E27FC236}">
+                <a16:creationId xmlns:a16="http://schemas.microsoft.com/office/drawing/2014/main" id="{A85A8A4D-F3F1-63D2-69D2-1876F2665B1D}"/>
+              </a:ext>
+            </a:extLst>
+          </p:cNvPr>
           <p:cNvSpPr>
             <a:spLocks noGrp="1"/>
           </p:cNvSpPr>
@@ -2076,41 +2059,10 @@
           </a:p>
         </p:txBody>
       </p:sp>
-      <p:cxnSp>
-        <p:nvCxnSpPr>
-          <p:cNvPr id="25" name="Straight Connector 24"/>
-          <p:cNvCxnSpPr/>
-          <p:nvPr/>
-        </p:nvCxnSpPr>
-        <p:spPr>
-          <a:xfrm>
-            <a:off x="1453896" y="1847088"/>
-            <a:ext cx="9607522" cy="0"/>
-          </a:xfrm>
-          <a:prstGeom prst="line">
-            <a:avLst/>
-          </a:prstGeom>
-          <a:ln w="31750"/>
-        </p:spPr>
-        <p:style>
-          <a:lnRef idx="3">
-            <a:schemeClr val="accent1"/>
-          </a:lnRef>
-          <a:fillRef idx="0">
-            <a:schemeClr val="accent1"/>
-          </a:fillRef>
-          <a:effectRef idx="2">
-            <a:schemeClr val="accent1"/>
-          </a:effectRef>
-          <a:fontRef idx="minor">
-            <a:schemeClr val="tx1"/>
-          </a:fontRef>
-        </p:style>
-      </p:cxnSp>
     </p:spTree>
     <p:extLst>
       <p:ext uri="{BB962C8B-B14F-4D97-AF65-F5344CB8AC3E}">
-        <p14:creationId xmlns:p14="http://schemas.microsoft.com/office/powerpoint/2010/main" val="851325633"/>
+        <p14:creationId xmlns:p14="http://schemas.microsoft.com/office/powerpoint/2010/main" val="2333846810"/>
       </p:ext>
     </p:extLst>
   </p:cSld>
@@ -2139,7 +2091,13 @@
       </p:grpSpPr>
       <p:sp>
         <p:nvSpPr>
-          <p:cNvPr id="2" name="Date Placeholder 1"/>
+          <p:cNvPr id="2" name="Date Placeholder 1">
+            <a:extLst>
+              <a:ext uri="{FF2B5EF4-FFF2-40B4-BE49-F238E27FC236}">
+                <a16:creationId xmlns:a16="http://schemas.microsoft.com/office/drawing/2014/main" id="{331D4B09-9F3C-F0BE-BA63-E1D563C4B776}"/>
+              </a:ext>
+            </a:extLst>
+          </p:cNvPr>
           <p:cNvSpPr>
             <a:spLocks noGrp="1"/>
           </p:cNvSpPr>
@@ -2154,7 +2112,7 @@
           <a:p>
             <a:fld id="{0B1E5D5D-8F7B-45A0-991D-D34D0876FD23}" type="datetimeFigureOut">
               <a:rPr lang="en-US" smtClean="0"/>
-              <a:t>4/25/2023</a:t>
+              <a:t>8/23/2023</a:t>
             </a:fld>
             <a:endParaRPr lang="en-US"/>
           </a:p>
@@ -2162,7 +2120,13 @@
       </p:sp>
       <p:sp>
         <p:nvSpPr>
-          <p:cNvPr id="3" name="Footer Placeholder 2"/>
+          <p:cNvPr id="3" name="Footer Placeholder 2">
+            <a:extLst>
+              <a:ext uri="{FF2B5EF4-FFF2-40B4-BE49-F238E27FC236}">
+                <a16:creationId xmlns:a16="http://schemas.microsoft.com/office/drawing/2014/main" id="{116CF3B5-F03B-3CB0-F8E3-F119C122EBD8}"/>
+              </a:ext>
+            </a:extLst>
+          </p:cNvPr>
           <p:cNvSpPr>
             <a:spLocks noGrp="1"/>
           </p:cNvSpPr>
@@ -2181,7 +2145,13 @@
       </p:sp>
       <p:sp>
         <p:nvSpPr>
-          <p:cNvPr id="4" name="Slide Number Placeholder 3"/>
+          <p:cNvPr id="4" name="Slide Number Placeholder 3">
+            <a:extLst>
+              <a:ext uri="{FF2B5EF4-FFF2-40B4-BE49-F238E27FC236}">
+                <a16:creationId xmlns:a16="http://schemas.microsoft.com/office/drawing/2014/main" id="{54434255-05AD-4EF3-6DCA-5E0C89820B10}"/>
+              </a:ext>
+            </a:extLst>
+          </p:cNvPr>
           <p:cNvSpPr>
             <a:spLocks noGrp="1"/>
           </p:cNvSpPr>
@@ -2205,7 +2175,7 @@
     </p:spTree>
     <p:extLst>
       <p:ext uri="{BB962C8B-B14F-4D97-AF65-F5344CB8AC3E}">
-        <p14:creationId xmlns:p14="http://schemas.microsoft.com/office/powerpoint/2010/main" val="1311322879"/>
+        <p14:creationId xmlns:p14="http://schemas.microsoft.com/office/powerpoint/2010/main" val="312625761"/>
       </p:ext>
     </p:extLst>
   </p:cSld>
@@ -2234,7 +2204,13 @@
       </p:grpSpPr>
       <p:sp>
         <p:nvSpPr>
-          <p:cNvPr id="2" name="Title 1"/>
+          <p:cNvPr id="2" name="Title 1">
+            <a:extLst>
+              <a:ext uri="{FF2B5EF4-FFF2-40B4-BE49-F238E27FC236}">
+                <a16:creationId xmlns:a16="http://schemas.microsoft.com/office/drawing/2014/main" id="{25A571F5-8416-5E87-CD25-B1B12A05E64F}"/>
+              </a:ext>
+            </a:extLst>
+          </p:cNvPr>
           <p:cNvSpPr>
             <a:spLocks noGrp="1"/>
           </p:cNvSpPr>
@@ -2244,17 +2220,15 @@
         </p:nvSpPr>
         <p:spPr>
           <a:xfrm>
-            <a:off x="1444671" y="798973"/>
-            <a:ext cx="3273099" cy="2247117"/>
+            <a:off x="839788" y="457200"/>
+            <a:ext cx="3932237" cy="1600200"/>
           </a:xfrm>
         </p:spPr>
         <p:txBody>
-          <a:bodyPr anchor="b">
-            <a:normAutofit/>
-          </a:bodyPr>
+          <a:bodyPr anchor="b"/>
           <a:lstStyle>
-            <a:lvl1pPr algn="l">
-              <a:defRPr sz="2400"/>
+            <a:lvl1pPr>
+              <a:defRPr sz="3200"/>
             </a:lvl1pPr>
           </a:lstStyle>
           <a:p>
@@ -2262,13 +2236,18 @@
               <a:rPr lang="en-US"/>
               <a:t>Click to edit Master title style</a:t>
             </a:r>
-            <a:endParaRPr lang="en-US" dirty="0"/>
-          </a:p>
-        </p:txBody>
-      </p:sp>
-      <p:sp>
-        <p:nvSpPr>
-          <p:cNvPr id="3" name="Content Placeholder 2"/>
+          </a:p>
+        </p:txBody>
+      </p:sp>
+      <p:sp>
+        <p:nvSpPr>
+          <p:cNvPr id="3" name="Content Placeholder 2">
+            <a:extLst>
+              <a:ext uri="{FF2B5EF4-FFF2-40B4-BE49-F238E27FC236}">
+                <a16:creationId xmlns:a16="http://schemas.microsoft.com/office/drawing/2014/main" id="{831E1BC8-EE60-C6FB-ADF5-FA63DC94265D}"/>
+              </a:ext>
+            </a:extLst>
+          </p:cNvPr>
           <p:cNvSpPr>
             <a:spLocks noGrp="1"/>
           </p:cNvSpPr>
@@ -2278,13 +2257,41 @@
         </p:nvSpPr>
         <p:spPr>
           <a:xfrm>
-            <a:off x="5043714" y="798974"/>
-            <a:ext cx="6012470" cy="4658826"/>
+            <a:off x="5183188" y="987425"/>
+            <a:ext cx="6172200" cy="4873625"/>
           </a:xfrm>
         </p:spPr>
         <p:txBody>
-          <a:bodyPr anchor="ctr"/>
-          <a:lstStyle/>
+          <a:bodyPr/>
+          <a:lstStyle>
+            <a:lvl1pPr>
+              <a:defRPr sz="3200"/>
+            </a:lvl1pPr>
+            <a:lvl2pPr>
+              <a:defRPr sz="2800"/>
+            </a:lvl2pPr>
+            <a:lvl3pPr>
+              <a:defRPr sz="2400"/>
+            </a:lvl3pPr>
+            <a:lvl4pPr>
+              <a:defRPr sz="2000"/>
+            </a:lvl4pPr>
+            <a:lvl5pPr>
+              <a:defRPr sz="2000"/>
+            </a:lvl5pPr>
+            <a:lvl6pPr>
+              <a:defRPr sz="2000"/>
+            </a:lvl6pPr>
+            <a:lvl7pPr>
+              <a:defRPr sz="2000"/>
+            </a:lvl7pPr>
+            <a:lvl8pPr>
+              <a:defRPr sz="2000"/>
+            </a:lvl8pPr>
+            <a:lvl9pPr>
+              <a:defRPr sz="2000"/>
+            </a:lvl9pPr>
+          </a:lstStyle>
           <a:p>
             <a:pPr lvl="0"/>
             <a:r>
@@ -2319,13 +2326,18 @@
               <a:rPr lang="en-US"/>
               <a:t>Fifth level</a:t>
             </a:r>
-            <a:endParaRPr lang="en-US" dirty="0"/>
-          </a:p>
-        </p:txBody>
-      </p:sp>
-      <p:sp>
-        <p:nvSpPr>
-          <p:cNvPr id="4" name="Text Placeholder 3"/>
+          </a:p>
+        </p:txBody>
+      </p:sp>
+      <p:sp>
+        <p:nvSpPr>
+          <p:cNvPr id="4" name="Text Placeholder 3">
+            <a:extLst>
+              <a:ext uri="{FF2B5EF4-FFF2-40B4-BE49-F238E27FC236}">
+                <a16:creationId xmlns:a16="http://schemas.microsoft.com/office/drawing/2014/main" id="{89D118FA-516A-2F30-FAF6-527318E0B6CA}"/>
+              </a:ext>
+            </a:extLst>
+          </p:cNvPr>
           <p:cNvSpPr>
             <a:spLocks noGrp="1"/>
           </p:cNvSpPr>
@@ -2335,14 +2347,14 @@
         </p:nvSpPr>
         <p:spPr>
           <a:xfrm>
-            <a:off x="1444671" y="3205491"/>
-            <a:ext cx="3275013" cy="2248181"/>
+            <a:off x="839788" y="2057400"/>
+            <a:ext cx="3932237" cy="3811588"/>
           </a:xfrm>
         </p:spPr>
         <p:txBody>
           <a:bodyPr/>
           <a:lstStyle>
-            <a:lvl1pPr marL="0" indent="0" algn="l">
+            <a:lvl1pPr marL="0" indent="0">
               <a:buNone/>
               <a:defRPr sz="1600"/>
             </a:lvl1pPr>
@@ -2390,7 +2402,13 @@
       </p:sp>
       <p:sp>
         <p:nvSpPr>
-          <p:cNvPr id="5" name="Date Placeholder 4"/>
+          <p:cNvPr id="5" name="Date Placeholder 4">
+            <a:extLst>
+              <a:ext uri="{FF2B5EF4-FFF2-40B4-BE49-F238E27FC236}">
+                <a16:creationId xmlns:a16="http://schemas.microsoft.com/office/drawing/2014/main" id="{5E71501F-0BA5-8341-D011-6DE6FC39535C}"/>
+              </a:ext>
+            </a:extLst>
+          </p:cNvPr>
           <p:cNvSpPr>
             <a:spLocks noGrp="1"/>
           </p:cNvSpPr>
@@ -2405,7 +2423,7 @@
           <a:p>
             <a:fld id="{0B1E5D5D-8F7B-45A0-991D-D34D0876FD23}" type="datetimeFigureOut">
               <a:rPr lang="en-US" smtClean="0"/>
-              <a:t>4/25/2023</a:t>
+              <a:t>8/23/2023</a:t>
             </a:fld>
             <a:endParaRPr lang="en-US"/>
           </a:p>
@@ -2413,7 +2431,13 @@
       </p:sp>
       <p:sp>
         <p:nvSpPr>
-          <p:cNvPr id="6" name="Footer Placeholder 5"/>
+          <p:cNvPr id="6" name="Footer Placeholder 5">
+            <a:extLst>
+              <a:ext uri="{FF2B5EF4-FFF2-40B4-BE49-F238E27FC236}">
+                <a16:creationId xmlns:a16="http://schemas.microsoft.com/office/drawing/2014/main" id="{814C4EB2-FAE7-C51A-7CF8-E3F8F132FE6E}"/>
+              </a:ext>
+            </a:extLst>
+          </p:cNvPr>
           <p:cNvSpPr>
             <a:spLocks noGrp="1"/>
           </p:cNvSpPr>
@@ -2432,7 +2456,13 @@
       </p:sp>
       <p:sp>
         <p:nvSpPr>
-          <p:cNvPr id="7" name="Slide Number Placeholder 6"/>
+          <p:cNvPr id="7" name="Slide Number Placeholder 6">
+            <a:extLst>
+              <a:ext uri="{FF2B5EF4-FFF2-40B4-BE49-F238E27FC236}">
+                <a16:creationId xmlns:a16="http://schemas.microsoft.com/office/drawing/2014/main" id="{CE0C7888-05F0-C61C-09CC-477975B6688F}"/>
+              </a:ext>
+            </a:extLst>
+          </p:cNvPr>
           <p:cNvSpPr>
             <a:spLocks noGrp="1"/>
           </p:cNvSpPr>
@@ -2453,41 +2483,10 @@
           </a:p>
         </p:txBody>
       </p:sp>
-      <p:cxnSp>
-        <p:nvCxnSpPr>
-          <p:cNvPr id="17" name="Straight Connector 16"/>
-          <p:cNvCxnSpPr/>
-          <p:nvPr/>
-        </p:nvCxnSpPr>
-        <p:spPr>
-          <a:xfrm>
-            <a:off x="1448280" y="3205491"/>
-            <a:ext cx="3269490" cy="0"/>
-          </a:xfrm>
-          <a:prstGeom prst="line">
-            <a:avLst/>
-          </a:prstGeom>
-          <a:ln w="31750"/>
-        </p:spPr>
-        <p:style>
-          <a:lnRef idx="3">
-            <a:schemeClr val="accent1"/>
-          </a:lnRef>
-          <a:fillRef idx="0">
-            <a:schemeClr val="accent1"/>
-          </a:fillRef>
-          <a:effectRef idx="2">
-            <a:schemeClr val="accent1"/>
-          </a:effectRef>
-          <a:fontRef idx="minor">
-            <a:schemeClr val="tx1"/>
-          </a:fontRef>
-        </p:style>
-      </p:cxnSp>
     </p:spTree>
     <p:extLst>
       <p:ext uri="{BB962C8B-B14F-4D97-AF65-F5344CB8AC3E}">
-        <p14:creationId xmlns:p14="http://schemas.microsoft.com/office/powerpoint/2010/main" val="317643564"/>
+        <p14:creationId xmlns:p14="http://schemas.microsoft.com/office/powerpoint/2010/main" val="3892440953"/>
       </p:ext>
     </p:extLst>
   </p:cSld>
@@ -2514,143 +2513,15 @@
           <a:chExt cx="0" cy="0"/>
         </a:xfrm>
       </p:grpSpPr>
-      <p:grpSp>
-        <p:nvGrpSpPr>
-          <p:cNvPr id="8" name="Group 7"/>
-          <p:cNvGrpSpPr/>
-          <p:nvPr/>
-        </p:nvGrpSpPr>
-        <p:grpSpPr>
-          <a:xfrm>
-            <a:off x="7477387" y="482170"/>
-            <a:ext cx="4074533" cy="5149101"/>
-            <a:chOff x="7477387" y="482170"/>
-            <a:chExt cx="4074533" cy="5149101"/>
-          </a:xfrm>
-        </p:grpSpPr>
-        <p:sp>
-          <p:nvSpPr>
-            <p:cNvPr id="18" name="Rectangle 17"/>
-            <p:cNvSpPr/>
-            <p:nvPr/>
-          </p:nvSpPr>
-          <p:spPr bwMode="black">
-            <a:xfrm>
-              <a:off x="7477387" y="482170"/>
-              <a:ext cx="4074533" cy="5149101"/>
-            </a:xfrm>
-            <a:prstGeom prst="rect">
-              <a:avLst/>
-            </a:prstGeom>
-            <a:gradFill>
-              <a:gsLst>
-                <a:gs pos="0">
-                  <a:srgbClr val="000001"/>
-                </a:gs>
-                <a:gs pos="100000">
-                  <a:srgbClr val="191919"/>
-                </a:gs>
-              </a:gsLst>
-            </a:gradFill>
-            <a:ln w="76200" cmpd="sng">
-              <a:noFill/>
-              <a:miter lim="800000"/>
-            </a:ln>
-            <a:effectLst>
-              <a:outerShdw blurRad="127000" dist="228600" dir="4740000" sx="98000" sy="98000" algn="tl" rotWithShape="0">
-                <a:srgbClr val="000000">
-                  <a:alpha val="34000"/>
-                </a:srgbClr>
-              </a:outerShdw>
-            </a:effectLst>
-            <a:scene3d>
-              <a:camera prst="orthographicFront"/>
-              <a:lightRig rig="threePt" dir="t"/>
-            </a:scene3d>
-            <a:sp3d>
-              <a:bevelT w="152400" h="50800" prst="softRound"/>
-            </a:sp3d>
-          </p:spPr>
-          <p:style>
-            <a:lnRef idx="1">
-              <a:schemeClr val="accent1"/>
-            </a:lnRef>
-            <a:fillRef idx="3">
-              <a:schemeClr val="accent1"/>
-            </a:fillRef>
-            <a:effectRef idx="2">
-              <a:schemeClr val="accent1"/>
-            </a:effectRef>
-            <a:fontRef idx="minor">
-              <a:schemeClr val="lt1"/>
-            </a:fontRef>
-          </p:style>
-        </p:sp>
-        <p:sp>
-          <p:nvSpPr>
-            <p:cNvPr id="19" name="Rectangle 18"/>
-            <p:cNvSpPr/>
-            <p:nvPr/>
-          </p:nvSpPr>
-          <p:spPr bwMode="blackWhite">
-            <a:xfrm>
-              <a:off x="7790446" y="812506"/>
-              <a:ext cx="3450289" cy="4466452"/>
-            </a:xfrm>
-            <a:prstGeom prst="rect">
-              <a:avLst/>
-            </a:prstGeom>
-            <a:gradFill>
-              <a:gsLst>
-                <a:gs pos="0">
-                  <a:srgbClr val="DADADA"/>
-                </a:gs>
-                <a:gs pos="100000">
-                  <a:srgbClr val="FFFFFE"/>
-                </a:gs>
-              </a:gsLst>
-              <a:lin ang="16200000" scaled="0"/>
-            </a:gradFill>
-            <a:ln w="50800" cmpd="sng">
-              <a:solidFill>
-                <a:srgbClr val="191919"/>
-              </a:solidFill>
-              <a:miter lim="800000"/>
-            </a:ln>
-            <a:effectLst>
-              <a:innerShdw blurRad="63500" dist="88900" dir="14100000">
-                <a:srgbClr val="000000">
-                  <a:alpha val="30000"/>
-                </a:srgbClr>
-              </a:innerShdw>
-            </a:effectLst>
-            <a:scene3d>
-              <a:camera prst="orthographicFront"/>
-              <a:lightRig rig="threePt" dir="t"/>
-            </a:scene3d>
-            <a:sp3d>
-              <a:bevelT prst="relaxedInset"/>
-            </a:sp3d>
-          </p:spPr>
-          <p:style>
-            <a:lnRef idx="1">
-              <a:schemeClr val="accent1"/>
-            </a:lnRef>
-            <a:fillRef idx="3">
-              <a:schemeClr val="accent1"/>
-            </a:fillRef>
-            <a:effectRef idx="2">
-              <a:schemeClr val="accent1"/>
-            </a:effectRef>
-            <a:fontRef idx="minor">
-              <a:schemeClr val="lt1"/>
-            </a:fontRef>
-          </p:style>
-        </p:sp>
-      </p:grpSp>
-      <p:sp>
-        <p:nvSpPr>
-          <p:cNvPr id="2" name="Title 1"/>
+      <p:sp>
+        <p:nvSpPr>
+          <p:cNvPr id="2" name="Title 1">
+            <a:extLst>
+              <a:ext uri="{FF2B5EF4-FFF2-40B4-BE49-F238E27FC236}">
+                <a16:creationId xmlns:a16="http://schemas.microsoft.com/office/drawing/2014/main" id="{9CCB4E7A-ADAE-2AF2-29AB-DDADAD52186D}"/>
+              </a:ext>
+            </a:extLst>
+          </p:cNvPr>
           <p:cNvSpPr>
             <a:spLocks noGrp="1"/>
           </p:cNvSpPr>
@@ -2660,14 +2531,12 @@
         </p:nvSpPr>
         <p:spPr>
           <a:xfrm>
-            <a:off x="1451206" y="1129513"/>
-            <a:ext cx="5532328" cy="1830584"/>
+            <a:off x="839788" y="457200"/>
+            <a:ext cx="3932237" cy="1600200"/>
           </a:xfrm>
         </p:spPr>
         <p:txBody>
-          <a:bodyPr anchor="b">
-            <a:normAutofit/>
-          </a:bodyPr>
+          <a:bodyPr anchor="b"/>
           <a:lstStyle>
             <a:lvl1pPr>
               <a:defRPr sz="3200"/>
@@ -2678,15 +2547,20 @@
               <a:rPr lang="en-US"/>
               <a:t>Click to edit Master title style</a:t>
             </a:r>
-            <a:endParaRPr lang="en-US" dirty="0"/>
-          </a:p>
-        </p:txBody>
-      </p:sp>
-      <p:sp>
-        <p:nvSpPr>
-          <p:cNvPr id="3" name="Picture Placeholder 2"/>
-          <p:cNvSpPr>
-            <a:spLocks noGrp="1" noChangeAspect="1"/>
+          </a:p>
+        </p:txBody>
+      </p:sp>
+      <p:sp>
+        <p:nvSpPr>
+          <p:cNvPr id="3" name="Picture Placeholder 2">
+            <a:extLst>
+              <a:ext uri="{FF2B5EF4-FFF2-40B4-BE49-F238E27FC236}">
+                <a16:creationId xmlns:a16="http://schemas.microsoft.com/office/drawing/2014/main" id="{24C606C1-BFBC-10CA-A44A-EB4403A1BF28}"/>
+              </a:ext>
+            </a:extLst>
+          </p:cNvPr>
+          <p:cNvSpPr>
+            <a:spLocks noGrp="1"/>
           </p:cNvSpPr>
           <p:nvPr>
             <p:ph type="pic" idx="1"/>
@@ -2694,24 +2568,14 @@
         </p:nvSpPr>
         <p:spPr>
           <a:xfrm>
-            <a:off x="8124389" y="1122542"/>
-            <a:ext cx="2791171" cy="3866327"/>
+            <a:off x="5183188" y="987425"/>
+            <a:ext cx="6172200" cy="4873625"/>
           </a:xfrm>
-          <a:solidFill>
-            <a:schemeClr val="bg1">
-              <a:lumMod val="85000"/>
-            </a:schemeClr>
-          </a:solidFill>
-          <a:ln w="9525" cap="sq">
-            <a:noFill/>
-            <a:miter lim="800000"/>
-          </a:ln>
-          <a:effectLst/>
         </p:spPr>
         <p:txBody>
-          <a:bodyPr anchor="t"/>
+          <a:bodyPr/>
           <a:lstStyle>
-            <a:lvl1pPr marL="0" indent="0" algn="ctr">
+            <a:lvl1pPr marL="0" indent="0">
               <a:buNone/>
               <a:defRPr sz="3200"/>
             </a:lvl1pPr>
@@ -2749,17 +2613,19 @@
             </a:lvl9pPr>
           </a:lstStyle>
           <a:p>
-            <a:r>
-              <a:rPr lang="en-US"/>
-              <a:t>Click icon to add picture</a:t>
-            </a:r>
-            <a:endParaRPr lang="en-US" dirty="0"/>
-          </a:p>
-        </p:txBody>
-      </p:sp>
-      <p:sp>
-        <p:nvSpPr>
-          <p:cNvPr id="4" name="Text Placeholder 3"/>
+            <a:endParaRPr lang="en-US"/>
+          </a:p>
+        </p:txBody>
+      </p:sp>
+      <p:sp>
+        <p:nvSpPr>
+          <p:cNvPr id="4" name="Text Placeholder 3">
+            <a:extLst>
+              <a:ext uri="{FF2B5EF4-FFF2-40B4-BE49-F238E27FC236}">
+                <a16:creationId xmlns:a16="http://schemas.microsoft.com/office/drawing/2014/main" id="{CC2ECCF3-75E9-8AF3-EB88-4660A015E841}"/>
+              </a:ext>
+            </a:extLst>
+          </p:cNvPr>
           <p:cNvSpPr>
             <a:spLocks noGrp="1"/>
           </p:cNvSpPr>
@@ -2769,18 +2635,16 @@
         </p:nvSpPr>
         <p:spPr>
           <a:xfrm>
-            <a:off x="1450329" y="3145992"/>
-            <a:ext cx="5524404" cy="2003742"/>
+            <a:off x="839788" y="2057400"/>
+            <a:ext cx="3932237" cy="3811588"/>
           </a:xfrm>
         </p:spPr>
         <p:txBody>
-          <a:bodyPr>
-            <a:normAutofit/>
-          </a:bodyPr>
+          <a:bodyPr/>
           <a:lstStyle>
-            <a:lvl1pPr marL="0" indent="0" algn="l">
+            <a:lvl1pPr marL="0" indent="0">
               <a:buNone/>
-              <a:defRPr sz="1800"/>
+              <a:defRPr sz="1600"/>
             </a:lvl1pPr>
             <a:lvl2pPr marL="457200" indent="0">
               <a:buNone/>
@@ -2826,7 +2690,13 @@
       </p:sp>
       <p:sp>
         <p:nvSpPr>
-          <p:cNvPr id="5" name="Date Placeholder 4"/>
+          <p:cNvPr id="5" name="Date Placeholder 4">
+            <a:extLst>
+              <a:ext uri="{FF2B5EF4-FFF2-40B4-BE49-F238E27FC236}">
+                <a16:creationId xmlns:a16="http://schemas.microsoft.com/office/drawing/2014/main" id="{2D9AB09F-7595-4E09-0D8A-ED9BE465E7EA}"/>
+              </a:ext>
+            </a:extLst>
+          </p:cNvPr>
           <p:cNvSpPr>
             <a:spLocks noGrp="1"/>
           </p:cNvSpPr>
@@ -2834,23 +2704,14 @@
             <p:ph type="dt" sz="half" idx="10"/>
           </p:nvPr>
         </p:nvSpPr>
-        <p:spPr>
-          <a:xfrm>
-            <a:off x="1447382" y="5469856"/>
-            <a:ext cx="5527351" cy="320123"/>
-          </a:xfrm>
-        </p:spPr>
-        <p:txBody>
-          <a:bodyPr/>
-          <a:lstStyle>
-            <a:lvl1pPr algn="l">
-              <a:defRPr/>
-            </a:lvl1pPr>
-          </a:lstStyle>
+        <p:spPr/>
+        <p:txBody>
+          <a:bodyPr/>
+          <a:lstStyle/>
           <a:p>
             <a:fld id="{0B1E5D5D-8F7B-45A0-991D-D34D0876FD23}" type="datetimeFigureOut">
               <a:rPr lang="en-US" smtClean="0"/>
-              <a:t>4/25/2023</a:t>
+              <a:t>8/23/2023</a:t>
             </a:fld>
             <a:endParaRPr lang="en-US"/>
           </a:p>
@@ -2858,7 +2719,13 @@
       </p:sp>
       <p:sp>
         <p:nvSpPr>
-          <p:cNvPr id="6" name="Footer Placeholder 5"/>
+          <p:cNvPr id="6" name="Footer Placeholder 5">
+            <a:extLst>
+              <a:ext uri="{FF2B5EF4-FFF2-40B4-BE49-F238E27FC236}">
+                <a16:creationId xmlns:a16="http://schemas.microsoft.com/office/drawing/2014/main" id="{04C6C89E-0D30-41A4-5E76-C3915EB8BDFA}"/>
+              </a:ext>
+            </a:extLst>
+          </p:cNvPr>
           <p:cNvSpPr>
             <a:spLocks noGrp="1"/>
           </p:cNvSpPr>
@@ -2866,12 +2733,7 @@
             <p:ph type="ftr" sz="quarter" idx="11"/>
           </p:nvPr>
         </p:nvSpPr>
-        <p:spPr>
-          <a:xfrm>
-            <a:off x="1447382" y="318640"/>
-            <a:ext cx="5541004" cy="320931"/>
-          </a:xfrm>
-        </p:spPr>
+        <p:spPr/>
         <p:txBody>
           <a:bodyPr/>
           <a:lstStyle/>
@@ -2882,7 +2744,13 @@
       </p:sp>
       <p:sp>
         <p:nvSpPr>
-          <p:cNvPr id="7" name="Slide Number Placeholder 6"/>
+          <p:cNvPr id="7" name="Slide Number Placeholder 6">
+            <a:extLst>
+              <a:ext uri="{FF2B5EF4-FFF2-40B4-BE49-F238E27FC236}">
+                <a16:creationId xmlns:a16="http://schemas.microsoft.com/office/drawing/2014/main" id="{0CD73EC2-CB01-AD7F-397D-D0ACEAFBB427}"/>
+              </a:ext>
+            </a:extLst>
+          </p:cNvPr>
           <p:cNvSpPr>
             <a:spLocks noGrp="1"/>
           </p:cNvSpPr>
@@ -2903,41 +2771,10 @@
           </a:p>
         </p:txBody>
       </p:sp>
-      <p:cxnSp>
-        <p:nvCxnSpPr>
-          <p:cNvPr id="31" name="Straight Connector 30"/>
-          <p:cNvCxnSpPr/>
-          <p:nvPr/>
-        </p:nvCxnSpPr>
-        <p:spPr>
-          <a:xfrm>
-            <a:off x="1447382" y="3143605"/>
-            <a:ext cx="5527351" cy="0"/>
-          </a:xfrm>
-          <a:prstGeom prst="line">
-            <a:avLst/>
-          </a:prstGeom>
-          <a:ln w="31750"/>
-        </p:spPr>
-        <p:style>
-          <a:lnRef idx="3">
-            <a:schemeClr val="accent1"/>
-          </a:lnRef>
-          <a:fillRef idx="0">
-            <a:schemeClr val="accent1"/>
-          </a:fillRef>
-          <a:effectRef idx="2">
-            <a:schemeClr val="accent1"/>
-          </a:effectRef>
-          <a:fontRef idx="minor">
-            <a:schemeClr val="tx1"/>
-          </a:fontRef>
-        </p:style>
-      </p:cxnSp>
     </p:spTree>
     <p:extLst>
       <p:ext uri="{BB962C8B-B14F-4D97-AF65-F5344CB8AC3E}">
-        <p14:creationId xmlns:p14="http://schemas.microsoft.com/office/powerpoint/2010/main" val="3726264452"/>
+        <p14:creationId xmlns:p14="http://schemas.microsoft.com/office/powerpoint/2010/main" val="1958457251"/>
       </p:ext>
     </p:extLst>
   </p:cSld>
@@ -2951,8 +2788,8 @@
 <p:sldMaster xmlns:a="http://schemas.openxmlformats.org/drawingml/2006/main" xmlns:r="http://schemas.openxmlformats.org/officeDocument/2006/relationships" xmlns:p="http://schemas.openxmlformats.org/presentationml/2006/main">
   <p:cSld>
     <p:bg>
-      <p:bgRef idx="1003">
-        <a:schemeClr val="bg2"/>
+      <p:bgRef idx="1001">
+        <a:schemeClr val="bg1"/>
       </p:bgRef>
     </p:bg>
     <p:spTree>
@@ -2971,201 +2808,139 @@
       </p:grpSpPr>
       <p:sp>
         <p:nvSpPr>
-          <p:cNvPr id="8" name="Rectangle 7"/>
-          <p:cNvSpPr/>
-          <p:nvPr/>
+          <p:cNvPr id="2" name="Title Placeholder 1">
+            <a:extLst>
+              <a:ext uri="{FF2B5EF4-FFF2-40B4-BE49-F238E27FC236}">
+                <a16:creationId xmlns:a16="http://schemas.microsoft.com/office/drawing/2014/main" id="{9E90DD55-4731-75C3-CDC4-889FEBE47FCC}"/>
+              </a:ext>
+            </a:extLst>
+          </p:cNvPr>
+          <p:cNvSpPr>
+            <a:spLocks noGrp="1"/>
+          </p:cNvSpPr>
+          <p:nvPr>
+            <p:ph type="title"/>
+          </p:nvPr>
         </p:nvSpPr>
         <p:spPr>
           <a:xfrm>
-            <a:off x="0" y="2019476"/>
-            <a:ext cx="12192000" cy="4105941"/>
-          </a:xfrm>
-          <a:prstGeom prst="rect">
-            <a:avLst/>
-          </a:prstGeom>
-          <a:gradFill flip="none" rotWithShape="1">
-            <a:gsLst>
-              <a:gs pos="0">
-                <a:schemeClr val="bg2">
-                  <a:alpha val="0"/>
-                </a:schemeClr>
-              </a:gs>
-              <a:gs pos="100000">
-                <a:schemeClr val="bg2"/>
-              </a:gs>
-            </a:gsLst>
-            <a:lin ang="5400000" scaled="0"/>
-            <a:tileRect/>
-          </a:gradFill>
-          <a:ln>
-            <a:noFill/>
-          </a:ln>
-        </p:spPr>
-        <p:style>
-          <a:lnRef idx="2">
-            <a:schemeClr val="accent1">
-              <a:shade val="50000"/>
-            </a:schemeClr>
-          </a:lnRef>
-          <a:fillRef idx="1">
-            <a:schemeClr val="accent1"/>
-          </a:fillRef>
-          <a:effectRef idx="0">
-            <a:schemeClr val="accent1"/>
-          </a:effectRef>
-          <a:fontRef idx="minor">
-            <a:schemeClr val="lt1"/>
-          </a:fontRef>
-        </p:style>
-      </p:sp>
-      <p:pic>
-        <p:nvPicPr>
-          <p:cNvPr id="7" name="Picture 6"/>
-          <p:cNvPicPr>
-            <a:picLocks noChangeAspect="1"/>
-          </p:cNvPicPr>
-          <p:nvPr/>
-        </p:nvPicPr>
-        <p:blipFill rotWithShape="1">
-          <a:blip r:embed="rId13">
-            <a:extLst>
-              <a:ext uri="{28A0092B-C50C-407E-A947-70E740481C1C}">
-                <a14:useLocalDpi xmlns:a14="http://schemas.microsoft.com/office/drawing/2010/main" val="0"/>
-              </a:ext>
-            </a:extLst>
-          </a:blip>
-          <a:srcRect t="1538" b="-1538"/>
-          <a:stretch/>
-        </p:blipFill>
-        <p:spPr bwMode="black">
-          <a:xfrm>
-            <a:off x="0" y="6126480"/>
-            <a:ext cx="12192000" cy="742950"/>
+            <a:off x="838200" y="365125"/>
+            <a:ext cx="10515600" cy="1325563"/>
           </a:xfrm>
           <a:prstGeom prst="rect">
             <a:avLst/>
           </a:prstGeom>
         </p:spPr>
-      </p:pic>
-      <p:sp>
-        <p:nvSpPr>
-          <p:cNvPr id="2" name="Title Placeholder 1"/>
-          <p:cNvSpPr>
-            <a:spLocks noGrp="1"/>
-          </p:cNvSpPr>
-          <p:nvPr>
-            <p:ph type="title"/>
+        <p:txBody>
+          <a:bodyPr vert="horz" lIns="91440" tIns="45720" rIns="91440" bIns="45720" rtlCol="0" anchor="ctr">
+            <a:normAutofit/>
+          </a:bodyPr>
+          <a:lstStyle/>
+          <a:p>
+            <a:r>
+              <a:rPr lang="en-US"/>
+              <a:t>Click to edit Master title style</a:t>
+            </a:r>
+          </a:p>
+        </p:txBody>
+      </p:sp>
+      <p:sp>
+        <p:nvSpPr>
+          <p:cNvPr id="3" name="Text Placeholder 2">
+            <a:extLst>
+              <a:ext uri="{FF2B5EF4-FFF2-40B4-BE49-F238E27FC236}">
+                <a16:creationId xmlns:a16="http://schemas.microsoft.com/office/drawing/2014/main" id="{54A20643-D4E0-F655-6F44-FD6FCA0E6026}"/>
+              </a:ext>
+            </a:extLst>
+          </p:cNvPr>
+          <p:cNvSpPr>
+            <a:spLocks noGrp="1"/>
+          </p:cNvSpPr>
+          <p:nvPr>
+            <p:ph type="body" idx="1"/>
           </p:nvPr>
         </p:nvSpPr>
         <p:spPr>
           <a:xfrm>
-            <a:off x="1451579" y="804519"/>
-            <a:ext cx="9603275" cy="1049235"/>
+            <a:off x="838200" y="1825625"/>
+            <a:ext cx="10515600" cy="4351338"/>
           </a:xfrm>
           <a:prstGeom prst="rect">
             <a:avLst/>
           </a:prstGeom>
         </p:spPr>
         <p:txBody>
-          <a:bodyPr vert="horz" lIns="91440" tIns="45720" rIns="91440" bIns="45720" rtlCol="0" anchor="t">
+          <a:bodyPr vert="horz" lIns="91440" tIns="45720" rIns="91440" bIns="45720" rtlCol="0">
             <a:normAutofit/>
           </a:bodyPr>
           <a:lstStyle/>
           <a:p>
+            <a:pPr lvl="0"/>
             <a:r>
               <a:rPr lang="en-US"/>
-              <a:t>Click to edit Master title style</a:t>
-            </a:r>
-            <a:endParaRPr lang="en-US" dirty="0"/>
-          </a:p>
-        </p:txBody>
-      </p:sp>
-      <p:sp>
-        <p:nvSpPr>
-          <p:cNvPr id="3" name="Text Placeholder 2"/>
-          <p:cNvSpPr>
-            <a:spLocks noGrp="1"/>
-          </p:cNvSpPr>
-          <p:nvPr>
-            <p:ph type="body" idx="1"/>
+              <a:t>Click to edit Master text styles</a:t>
+            </a:r>
+          </a:p>
+          <a:p>
+            <a:pPr lvl="1"/>
+            <a:r>
+              <a:rPr lang="en-US"/>
+              <a:t>Second level</a:t>
+            </a:r>
+          </a:p>
+          <a:p>
+            <a:pPr lvl="2"/>
+            <a:r>
+              <a:rPr lang="en-US"/>
+              <a:t>Third level</a:t>
+            </a:r>
+          </a:p>
+          <a:p>
+            <a:pPr lvl="3"/>
+            <a:r>
+              <a:rPr lang="en-US"/>
+              <a:t>Fourth level</a:t>
+            </a:r>
+          </a:p>
+          <a:p>
+            <a:pPr lvl="4"/>
+            <a:r>
+              <a:rPr lang="en-US"/>
+              <a:t>Fifth level</a:t>
+            </a:r>
+          </a:p>
+        </p:txBody>
+      </p:sp>
+      <p:sp>
+        <p:nvSpPr>
+          <p:cNvPr id="4" name="Date Placeholder 3">
+            <a:extLst>
+              <a:ext uri="{FF2B5EF4-FFF2-40B4-BE49-F238E27FC236}">
+                <a16:creationId xmlns:a16="http://schemas.microsoft.com/office/drawing/2014/main" id="{A0F5225F-7F46-2C29-8F21-ED21CDA06424}"/>
+              </a:ext>
+            </a:extLst>
+          </p:cNvPr>
+          <p:cNvSpPr>
+            <a:spLocks noGrp="1"/>
+          </p:cNvSpPr>
+          <p:nvPr>
+            <p:ph type="dt" sz="half" idx="2"/>
           </p:nvPr>
         </p:nvSpPr>
         <p:spPr>
           <a:xfrm>
-            <a:off x="1451579" y="2015732"/>
-            <a:ext cx="9603275" cy="3450613"/>
+            <a:off x="838200" y="6356350"/>
+            <a:ext cx="2743200" cy="365125"/>
           </a:xfrm>
           <a:prstGeom prst="rect">
             <a:avLst/>
           </a:prstGeom>
         </p:spPr>
         <p:txBody>
-          <a:bodyPr vert="horz" lIns="91440" tIns="45720" rIns="91440" bIns="45720" rtlCol="0">
-            <a:normAutofit/>
-          </a:bodyPr>
-          <a:lstStyle/>
-          <a:p>
-            <a:pPr lvl="0"/>
-            <a:r>
-              <a:rPr lang="en-US"/>
-              <a:t>Click to edit Master text styles</a:t>
-            </a:r>
-          </a:p>
-          <a:p>
-            <a:pPr lvl="1"/>
-            <a:r>
-              <a:rPr lang="en-US"/>
-              <a:t>Second level</a:t>
-            </a:r>
-          </a:p>
-          <a:p>
-            <a:pPr lvl="2"/>
-            <a:r>
-              <a:rPr lang="en-US"/>
-              <a:t>Third level</a:t>
-            </a:r>
-          </a:p>
-          <a:p>
-            <a:pPr lvl="3"/>
-            <a:r>
-              <a:rPr lang="en-US"/>
-              <a:t>Fourth level</a:t>
-            </a:r>
-          </a:p>
-          <a:p>
-            <a:pPr lvl="4"/>
-            <a:r>
-              <a:rPr lang="en-US"/>
-              <a:t>Fifth level</a:t>
-            </a:r>
-            <a:endParaRPr lang="en-US" dirty="0"/>
-          </a:p>
-        </p:txBody>
-      </p:sp>
-      <p:sp>
-        <p:nvSpPr>
-          <p:cNvPr id="4" name="Date Placeholder 3"/>
-          <p:cNvSpPr>
-            <a:spLocks noGrp="1"/>
-          </p:cNvSpPr>
-          <p:nvPr>
-            <p:ph type="dt" sz="half" idx="2"/>
-          </p:nvPr>
-        </p:nvSpPr>
-        <p:spPr>
-          <a:xfrm>
-            <a:off x="7554138" y="330370"/>
-            <a:ext cx="3500715" cy="309201"/>
-          </a:xfrm>
-          <a:prstGeom prst="rect">
-            <a:avLst/>
-          </a:prstGeom>
-        </p:spPr>
-        <p:txBody>
           <a:bodyPr vert="horz" lIns="91440" tIns="45720" rIns="91440" bIns="45720" rtlCol="0" anchor="ctr"/>
           <a:lstStyle>
-            <a:lvl1pPr algn="r">
-              <a:defRPr sz="1000">
+            <a:lvl1pPr algn="l">
+              <a:defRPr sz="1200">
                 <a:solidFill>
                   <a:schemeClr val="tx1">
                     <a:tint val="75000"/>
@@ -3177,7 +2952,7 @@
           <a:p>
             <a:fld id="{0B1E5D5D-8F7B-45A0-991D-D34D0876FD23}" type="datetimeFigureOut">
               <a:rPr lang="en-US" smtClean="0"/>
-              <a:t>4/25/2023</a:t>
+              <a:t>8/23/2023</a:t>
             </a:fld>
             <a:endParaRPr lang="en-US"/>
           </a:p>
@@ -3185,7 +2960,13 @@
       </p:sp>
       <p:sp>
         <p:nvSpPr>
-          <p:cNvPr id="5" name="Footer Placeholder 4"/>
+          <p:cNvPr id="5" name="Footer Placeholder 4">
+            <a:extLst>
+              <a:ext uri="{FF2B5EF4-FFF2-40B4-BE49-F238E27FC236}">
+                <a16:creationId xmlns:a16="http://schemas.microsoft.com/office/drawing/2014/main" id="{F64ECF39-83DF-87E3-E2CF-E0D92CB07D53}"/>
+              </a:ext>
+            </a:extLst>
+          </p:cNvPr>
           <p:cNvSpPr>
             <a:spLocks noGrp="1"/>
           </p:cNvSpPr>
@@ -3195,8 +2976,8 @@
         </p:nvSpPr>
         <p:spPr>
           <a:xfrm>
-            <a:off x="1451579" y="329307"/>
-            <a:ext cx="5938836" cy="309201"/>
+            <a:off x="4038600" y="6356350"/>
+            <a:ext cx="4114800" cy="365125"/>
           </a:xfrm>
           <a:prstGeom prst="rect">
             <a:avLst/>
@@ -3205,8 +2986,8 @@
         <p:txBody>
           <a:bodyPr vert="horz" lIns="91440" tIns="45720" rIns="91440" bIns="45720" rtlCol="0" anchor="ctr"/>
           <a:lstStyle>
-            <a:lvl1pPr algn="l">
-              <a:defRPr sz="1000">
+            <a:lvl1pPr algn="ctr">
+              <a:defRPr sz="1200">
                 <a:solidFill>
                   <a:schemeClr val="tx1">
                     <a:tint val="75000"/>
@@ -3222,7 +3003,13 @@
       </p:sp>
       <p:sp>
         <p:nvSpPr>
-          <p:cNvPr id="6" name="Slide Number Placeholder 5"/>
+          <p:cNvPr id="6" name="Slide Number Placeholder 5">
+            <a:extLst>
+              <a:ext uri="{FF2B5EF4-FFF2-40B4-BE49-F238E27FC236}">
+                <a16:creationId xmlns:a16="http://schemas.microsoft.com/office/drawing/2014/main" id="{20EE8123-4A08-F587-1A43-AE89FB9F622E}"/>
+              </a:ext>
+            </a:extLst>
+          </p:cNvPr>
           <p:cNvSpPr>
             <a:spLocks noGrp="1"/>
           </p:cNvSpPr>
@@ -3232,20 +3019,22 @@
         </p:nvSpPr>
         <p:spPr>
           <a:xfrm>
-            <a:off x="480060" y="798973"/>
-            <a:ext cx="811019" cy="503578"/>
+            <a:off x="8610600" y="6356350"/>
+            <a:ext cx="2743200" cy="365125"/>
           </a:xfrm>
           <a:prstGeom prst="rect">
             <a:avLst/>
           </a:prstGeom>
         </p:spPr>
         <p:txBody>
-          <a:bodyPr vert="horz" lIns="91440" tIns="45720" rIns="91440" bIns="45720" rtlCol="0" anchor="t"/>
+          <a:bodyPr vert="horz" lIns="91440" tIns="45720" rIns="91440" bIns="45720" rtlCol="0" anchor="ctr"/>
           <a:lstStyle>
             <a:lvl1pPr algn="r">
-              <a:defRPr sz="2800">
+              <a:defRPr sz="1200">
                 <a:solidFill>
-                  <a:schemeClr val="accent1"/>
+                  <a:schemeClr val="tx1">
+                    <a:tint val="75000"/>
+                  </a:schemeClr>
                 </a:solidFill>
               </a:defRPr>
             </a:lvl1pPr>
@@ -3259,63 +3048,26 @@
           </a:p>
         </p:txBody>
       </p:sp>
-      <p:cxnSp>
-        <p:nvCxnSpPr>
-          <p:cNvPr id="10" name="Straight Connector 9"/>
-          <p:cNvCxnSpPr/>
-          <p:nvPr/>
-        </p:nvCxnSpPr>
-        <p:spPr>
-          <a:xfrm>
-            <a:off x="0" y="6128413"/>
-            <a:ext cx="12192000" cy="0"/>
-          </a:xfrm>
-          <a:prstGeom prst="line">
-            <a:avLst/>
-          </a:prstGeom>
-          <a:ln w="12700">
-            <a:solidFill>
-              <a:srgbClr val="000001">
-                <a:alpha val="20000"/>
-              </a:srgbClr>
-            </a:solidFill>
-          </a:ln>
-        </p:spPr>
-        <p:style>
-          <a:lnRef idx="1">
-            <a:schemeClr val="accent1"/>
-          </a:lnRef>
-          <a:fillRef idx="0">
-            <a:schemeClr val="accent1"/>
-          </a:fillRef>
-          <a:effectRef idx="0">
-            <a:schemeClr val="accent1"/>
-          </a:effectRef>
-          <a:fontRef idx="minor">
-            <a:schemeClr val="tx1"/>
-          </a:fontRef>
-        </p:style>
-      </p:cxnSp>
     </p:spTree>
     <p:extLst>
       <p:ext uri="{BB962C8B-B14F-4D97-AF65-F5344CB8AC3E}">
-        <p14:creationId xmlns:p14="http://schemas.microsoft.com/office/powerpoint/2010/main" val="1294206907"/>
+        <p14:creationId xmlns:p14="http://schemas.microsoft.com/office/powerpoint/2010/main" val="373311416"/>
       </p:ext>
     </p:extLst>
   </p:cSld>
   <p:clrMap bg1="lt1" tx1="dk1" bg2="lt2" tx2="dk2" accent1="accent1" accent2="accent2" accent3="accent3" accent4="accent4" accent5="accent5" accent6="accent6" hlink="hlink" folHlink="folHlink"/>
   <p:sldLayoutIdLst>
-    <p:sldLayoutId id="2147483661" r:id="rId1"/>
-    <p:sldLayoutId id="2147483662" r:id="rId2"/>
-    <p:sldLayoutId id="2147483663" r:id="rId3"/>
-    <p:sldLayoutId id="2147483664" r:id="rId4"/>
-    <p:sldLayoutId id="2147483665" r:id="rId5"/>
-    <p:sldLayoutId id="2147483666" r:id="rId6"/>
-    <p:sldLayoutId id="2147483667" r:id="rId7"/>
-    <p:sldLayoutId id="2147483668" r:id="rId8"/>
-    <p:sldLayoutId id="2147483669" r:id="rId9"/>
-    <p:sldLayoutId id="2147483670" r:id="rId10"/>
-    <p:sldLayoutId id="2147483671" r:id="rId11"/>
+    <p:sldLayoutId id="2147483673" r:id="rId1"/>
+    <p:sldLayoutId id="2147483674" r:id="rId2"/>
+    <p:sldLayoutId id="2147483675" r:id="rId3"/>
+    <p:sldLayoutId id="2147483676" r:id="rId4"/>
+    <p:sldLayoutId id="2147483677" r:id="rId5"/>
+    <p:sldLayoutId id="2147483678" r:id="rId6"/>
+    <p:sldLayoutId id="2147483679" r:id="rId7"/>
+    <p:sldLayoutId id="2147483680" r:id="rId8"/>
+    <p:sldLayoutId id="2147483681" r:id="rId9"/>
+    <p:sldLayoutId id="2147483682" r:id="rId10"/>
+    <p:sldLayoutId id="2147483683" r:id="rId11"/>
   </p:sldLayoutIdLst>
   <p:txStyles>
     <p:titleStyle>
@@ -3327,11 +3079,10 @@
           <a:spcPct val="0"/>
         </a:spcBef>
         <a:buNone/>
-        <a:defRPr sz="3200" b="0" i="0" kern="1200" cap="all">
+        <a:defRPr sz="4400" kern="1200">
           <a:solidFill>
             <a:schemeClr val="tx1"/>
           </a:solidFill>
-          <a:effectLst/>
           <a:latin typeface="+mj-lt"/>
           <a:ea typeface="+mj-ea"/>
           <a:cs typeface="+mj-cs"/>
@@ -3341,22 +3092,17 @@
     <p:bodyStyle>
       <a:lvl1pPr marL="228600" indent="-228600" algn="l" defTabSz="914400" rtl="0" eaLnBrk="1" latinLnBrk="0" hangingPunct="1">
         <a:lnSpc>
-          <a:spcPct val="120000"/>
+          <a:spcPct val="90000"/>
         </a:lnSpc>
         <a:spcBef>
           <a:spcPts val="1000"/>
         </a:spcBef>
-        <a:buClr>
-          <a:schemeClr val="accent1"/>
-        </a:buClr>
-        <a:buSzPct val="100000"/>
         <a:buFont typeface="Arial" panose="020B0604020202020204" pitchFamily="34" charset="0"/>
         <a:buChar char="•"/>
-        <a:defRPr sz="2000" kern="1200">
+        <a:defRPr sz="2800" kern="1200">
           <a:solidFill>
             <a:schemeClr val="tx1"/>
           </a:solidFill>
-          <a:effectLst/>
           <a:latin typeface="+mn-lt"/>
           <a:ea typeface="+mn-ea"/>
           <a:cs typeface="+mn-cs"/>
@@ -3364,22 +3110,17 @@
       </a:lvl1pPr>
       <a:lvl2pPr marL="685800" indent="-228600" algn="l" defTabSz="914400" rtl="0" eaLnBrk="1" latinLnBrk="0" hangingPunct="1">
         <a:lnSpc>
-          <a:spcPct val="120000"/>
+          <a:spcPct val="90000"/>
         </a:lnSpc>
         <a:spcBef>
           <a:spcPts val="500"/>
         </a:spcBef>
-        <a:buClr>
-          <a:schemeClr val="accent1"/>
-        </a:buClr>
-        <a:buSzPct val="100000"/>
         <a:buFont typeface="Arial" panose="020B0604020202020204" pitchFamily="34" charset="0"/>
         <a:buChar char="•"/>
-        <a:defRPr sz="1800" kern="1200" cap="none" baseline="0">
+        <a:defRPr sz="2400" kern="1200">
           <a:solidFill>
             <a:schemeClr val="tx1"/>
           </a:solidFill>
-          <a:effectLst/>
           <a:latin typeface="+mn-lt"/>
           <a:ea typeface="+mn-ea"/>
           <a:cs typeface="+mn-cs"/>
@@ -3387,22 +3128,17 @@
       </a:lvl2pPr>
       <a:lvl3pPr marL="1143000" indent="-228600" algn="l" defTabSz="914400" rtl="0" eaLnBrk="1" latinLnBrk="0" hangingPunct="1">
         <a:lnSpc>
-          <a:spcPct val="120000"/>
+          <a:spcPct val="90000"/>
         </a:lnSpc>
         <a:spcBef>
           <a:spcPts val="500"/>
         </a:spcBef>
-        <a:buClr>
-          <a:schemeClr val="accent1"/>
-        </a:buClr>
-        <a:buSzPct val="100000"/>
         <a:buFont typeface="Arial" panose="020B0604020202020204" pitchFamily="34" charset="0"/>
         <a:buChar char="•"/>
-        <a:defRPr sz="1600" kern="1200">
+        <a:defRPr sz="2000" kern="1200">
           <a:solidFill>
             <a:schemeClr val="tx1"/>
           </a:solidFill>
-          <a:effectLst/>
           <a:latin typeface="+mn-lt"/>
           <a:ea typeface="+mn-ea"/>
           <a:cs typeface="+mn-cs"/>
@@ -3410,22 +3146,17 @@
       </a:lvl3pPr>
       <a:lvl4pPr marL="1600200" indent="-228600" algn="l" defTabSz="914400" rtl="0" eaLnBrk="1" latinLnBrk="0" hangingPunct="1">
         <a:lnSpc>
-          <a:spcPct val="120000"/>
+          <a:spcPct val="90000"/>
         </a:lnSpc>
         <a:spcBef>
           <a:spcPts val="500"/>
         </a:spcBef>
-        <a:buClr>
-          <a:schemeClr val="accent1"/>
-        </a:buClr>
-        <a:buSzPct val="100000"/>
         <a:buFont typeface="Arial" panose="020B0604020202020204" pitchFamily="34" charset="0"/>
         <a:buChar char="•"/>
-        <a:defRPr sz="1400" kern="1200" cap="none" baseline="0">
+        <a:defRPr sz="1800" kern="1200">
           <a:solidFill>
             <a:schemeClr val="tx1"/>
           </a:solidFill>
-          <a:effectLst/>
           <a:latin typeface="+mn-lt"/>
           <a:ea typeface="+mn-ea"/>
           <a:cs typeface="+mn-cs"/>
@@ -3433,22 +3164,17 @@
       </a:lvl4pPr>
       <a:lvl5pPr marL="2057400" indent="-228600" algn="l" defTabSz="914400" rtl="0" eaLnBrk="1" latinLnBrk="0" hangingPunct="1">
         <a:lnSpc>
-          <a:spcPct val="120000"/>
+          <a:spcPct val="90000"/>
         </a:lnSpc>
         <a:spcBef>
           <a:spcPts val="500"/>
         </a:spcBef>
-        <a:buClr>
-          <a:schemeClr val="accent1"/>
-        </a:buClr>
-        <a:buSzPct val="100000"/>
         <a:buFont typeface="Arial" panose="020B0604020202020204" pitchFamily="34" charset="0"/>
         <a:buChar char="•"/>
-        <a:defRPr sz="1200" kern="1200">
+        <a:defRPr sz="1800" kern="1200">
           <a:solidFill>
             <a:schemeClr val="tx1"/>
           </a:solidFill>
-          <a:effectLst/>
           <a:latin typeface="+mn-lt"/>
           <a:ea typeface="+mn-ea"/>
           <a:cs typeface="+mn-cs"/>
@@ -3456,22 +3182,17 @@
       </a:lvl5pPr>
       <a:lvl6pPr marL="2514600" indent="-228600" algn="l" defTabSz="914400" rtl="0" eaLnBrk="1" latinLnBrk="0" hangingPunct="1">
         <a:lnSpc>
-          <a:spcPct val="120000"/>
+          <a:spcPct val="90000"/>
         </a:lnSpc>
         <a:spcBef>
           <a:spcPts val="500"/>
         </a:spcBef>
-        <a:buClr>
-          <a:schemeClr val="accent1"/>
-        </a:buClr>
-        <a:buSzPct val="100000"/>
         <a:buFont typeface="Arial" panose="020B0604020202020204" pitchFamily="34" charset="0"/>
         <a:buChar char="•"/>
-        <a:defRPr sz="1200" kern="1200">
+        <a:defRPr sz="1800" kern="1200">
           <a:solidFill>
             <a:schemeClr val="tx1"/>
           </a:solidFill>
-          <a:effectLst/>
           <a:latin typeface="+mn-lt"/>
           <a:ea typeface="+mn-ea"/>
           <a:cs typeface="+mn-cs"/>
@@ -3479,22 +3200,17 @@
       </a:lvl6pPr>
       <a:lvl7pPr marL="2971800" indent="-228600" algn="l" defTabSz="914400" rtl="0" eaLnBrk="1" latinLnBrk="0" hangingPunct="1">
         <a:lnSpc>
-          <a:spcPct val="120000"/>
+          <a:spcPct val="90000"/>
         </a:lnSpc>
         <a:spcBef>
           <a:spcPts val="500"/>
         </a:spcBef>
-        <a:buClr>
-          <a:schemeClr val="accent1"/>
-        </a:buClr>
-        <a:buSzPct val="100000"/>
         <a:buFont typeface="Arial" panose="020B0604020202020204" pitchFamily="34" charset="0"/>
         <a:buChar char="•"/>
-        <a:defRPr sz="1200" kern="1200">
+        <a:defRPr sz="1800" kern="1200">
           <a:solidFill>
             <a:schemeClr val="tx1"/>
           </a:solidFill>
-          <a:effectLst/>
           <a:latin typeface="+mn-lt"/>
           <a:ea typeface="+mn-ea"/>
           <a:cs typeface="+mn-cs"/>
@@ -3502,22 +3218,17 @@
       </a:lvl7pPr>
       <a:lvl8pPr marL="3429000" indent="-228600" algn="l" defTabSz="914400" rtl="0" eaLnBrk="1" latinLnBrk="0" hangingPunct="1">
         <a:lnSpc>
-          <a:spcPct val="120000"/>
+          <a:spcPct val="90000"/>
         </a:lnSpc>
         <a:spcBef>
           <a:spcPts val="500"/>
         </a:spcBef>
-        <a:buClr>
-          <a:schemeClr val="accent1"/>
-        </a:buClr>
-        <a:buSzPct val="100000"/>
         <a:buFont typeface="Arial" panose="020B0604020202020204" pitchFamily="34" charset="0"/>
         <a:buChar char="•"/>
-        <a:defRPr sz="1200" kern="1200" baseline="0">
+        <a:defRPr sz="1800" kern="1200">
           <a:solidFill>
             <a:schemeClr val="tx1"/>
           </a:solidFill>
-          <a:effectLst/>
           <a:latin typeface="+mn-lt"/>
           <a:ea typeface="+mn-ea"/>
           <a:cs typeface="+mn-cs"/>
@@ -3525,22 +3236,17 @@
       </a:lvl8pPr>
       <a:lvl9pPr marL="3886200" indent="-228600" algn="l" defTabSz="914400" rtl="0" eaLnBrk="1" latinLnBrk="0" hangingPunct="1">
         <a:lnSpc>
-          <a:spcPct val="120000"/>
+          <a:spcPct val="90000"/>
         </a:lnSpc>
         <a:spcBef>
           <a:spcPts val="500"/>
         </a:spcBef>
-        <a:buClr>
-          <a:schemeClr val="accent1"/>
-        </a:buClr>
-        <a:buSzPct val="100000"/>
         <a:buFont typeface="Arial" panose="020B0604020202020204" pitchFamily="34" charset="0"/>
         <a:buChar char="•"/>
-        <a:defRPr sz="1200" kern="1200" baseline="0">
+        <a:defRPr sz="1800" kern="1200">
           <a:solidFill>
             <a:schemeClr val="tx1"/>
           </a:solidFill>
-          <a:effectLst/>
           <a:latin typeface="+mn-lt"/>
           <a:ea typeface="+mn-ea"/>
           <a:cs typeface="+mn-cs"/>
@@ -5171,6 +4877,42 @@
           </a:p>
         </p:txBody>
       </p:sp>
+      <p:pic>
+        <p:nvPicPr>
+          <p:cNvPr id="4" name="Picture 3" descr="A screen shot of a computer program&#10;&#10;Description automatically generated">
+            <a:extLst>
+              <a:ext uri="{FF2B5EF4-FFF2-40B4-BE49-F238E27FC236}">
+                <a16:creationId xmlns:a16="http://schemas.microsoft.com/office/drawing/2014/main" id="{3185BC67-52C6-A778-E968-0CF52D56BA22}"/>
+              </a:ext>
+            </a:extLst>
+          </p:cNvPr>
+          <p:cNvPicPr>
+            <a:picLocks noChangeAspect="1"/>
+          </p:cNvPicPr>
+          <p:nvPr/>
+        </p:nvPicPr>
+        <p:blipFill>
+          <a:blip r:embed="rId2">
+            <a:extLst>
+              <a:ext uri="{28A0092B-C50C-407E-A947-70E740481C1C}">
+                <a14:useLocalDpi xmlns:a14="http://schemas.microsoft.com/office/drawing/2010/main" val="0"/>
+              </a:ext>
+            </a:extLst>
+          </a:blip>
+          <a:stretch>
+            <a:fillRect/>
+          </a:stretch>
+        </p:blipFill>
+        <p:spPr>
+          <a:xfrm>
+            <a:off x="8506691" y="3221287"/>
+            <a:ext cx="3685309" cy="3636713"/>
+          </a:xfrm>
+          <a:prstGeom prst="rect">
+            <a:avLst/>
+          </a:prstGeom>
+        </p:spPr>
+      </p:pic>
     </p:spTree>
     <p:extLst>
       <p:ext uri="{BB962C8B-B14F-4D97-AF65-F5344CB8AC3E}">
@@ -5252,20 +4994,6 @@
           <a:p>
             <a:r>
               <a:rPr lang="en-US" dirty="0"/>
-              <a:t>You can access methods using the syntax: </a:t>
-            </a:r>
-            <a:r>
-              <a:rPr lang="en-US" dirty="0" err="1"/>
-              <a:t>objectName.methodName</a:t>
-            </a:r>
-            <a:r>
-              <a:rPr lang="en-US" dirty="0"/>
-              <a:t>()</a:t>
-            </a:r>
-          </a:p>
-          <a:p>
-            <a:r>
-              <a:rPr lang="en-US" dirty="0"/>
               <a:t>This will only execute if it is </a:t>
             </a:r>
             <a:r>
@@ -5279,6 +5007,78 @@
           </a:p>
         </p:txBody>
       </p:sp>
+      <p:pic>
+        <p:nvPicPr>
+          <p:cNvPr id="4" name="Picture 3" descr="A screen shot of a computer program&#10;&#10;Description automatically generated">
+            <a:extLst>
+              <a:ext uri="{FF2B5EF4-FFF2-40B4-BE49-F238E27FC236}">
+                <a16:creationId xmlns:a16="http://schemas.microsoft.com/office/drawing/2014/main" id="{68B5E7B6-4525-C881-BD13-56CEBB16DB55}"/>
+              </a:ext>
+            </a:extLst>
+          </p:cNvPr>
+          <p:cNvPicPr>
+            <a:picLocks noChangeAspect="1"/>
+          </p:cNvPicPr>
+          <p:nvPr/>
+        </p:nvPicPr>
+        <p:blipFill>
+          <a:blip r:embed="rId2">
+            <a:extLst>
+              <a:ext uri="{28A0092B-C50C-407E-A947-70E740481C1C}">
+                <a14:useLocalDpi xmlns:a14="http://schemas.microsoft.com/office/drawing/2010/main" val="0"/>
+              </a:ext>
+            </a:extLst>
+          </a:blip>
+          <a:stretch>
+            <a:fillRect/>
+          </a:stretch>
+        </p:blipFill>
+        <p:spPr>
+          <a:xfrm>
+            <a:off x="8506691" y="3221287"/>
+            <a:ext cx="3685309" cy="3636713"/>
+          </a:xfrm>
+          <a:prstGeom prst="rect">
+            <a:avLst/>
+          </a:prstGeom>
+        </p:spPr>
+      </p:pic>
+      <p:pic>
+        <p:nvPicPr>
+          <p:cNvPr id="6" name="Picture 5" descr="A computer screen shot of code&#10;&#10;Description automatically generated">
+            <a:extLst>
+              <a:ext uri="{FF2B5EF4-FFF2-40B4-BE49-F238E27FC236}">
+                <a16:creationId xmlns:a16="http://schemas.microsoft.com/office/drawing/2014/main" id="{4C87730D-9246-F6A7-27F4-DED3DF851D25}"/>
+              </a:ext>
+            </a:extLst>
+          </p:cNvPr>
+          <p:cNvPicPr>
+            <a:picLocks noChangeAspect="1"/>
+          </p:cNvPicPr>
+          <p:nvPr/>
+        </p:nvPicPr>
+        <p:blipFill>
+          <a:blip r:embed="rId3">
+            <a:extLst>
+              <a:ext uri="{28A0092B-C50C-407E-A947-70E740481C1C}">
+                <a14:useLocalDpi xmlns:a14="http://schemas.microsoft.com/office/drawing/2010/main" val="0"/>
+              </a:ext>
+            </a:extLst>
+          </a:blip>
+          <a:stretch>
+            <a:fillRect/>
+          </a:stretch>
+        </p:blipFill>
+        <p:spPr>
+          <a:xfrm>
+            <a:off x="-1" y="3216922"/>
+            <a:ext cx="4738255" cy="3641078"/>
+          </a:xfrm>
+          <a:prstGeom prst="rect">
+            <a:avLst/>
+          </a:prstGeom>
+        </p:spPr>
+      </p:pic>
     </p:spTree>
     <p:extLst>
       <p:ext uri="{BB962C8B-B14F-4D97-AF65-F5344CB8AC3E}">
@@ -5491,7 +5291,7 @@
           <a:p>
             <a:r>
               <a:rPr lang="en-US" dirty="0"/>
-              <a:t>We are able to use all of the built-in methods of each data type inside of our objects</a:t>
+              <a:t>We can use all the built-in methods of each data type inside of our objects</a:t>
             </a:r>
           </a:p>
           <a:p>
@@ -5740,6 +5540,78 @@
           </a:p>
         </p:txBody>
       </p:sp>
+      <p:pic>
+        <p:nvPicPr>
+          <p:cNvPr id="5" name="Picture 4">
+            <a:extLst>
+              <a:ext uri="{FF2B5EF4-FFF2-40B4-BE49-F238E27FC236}">
+                <a16:creationId xmlns:a16="http://schemas.microsoft.com/office/drawing/2014/main" id="{8A9845E5-D85B-486B-FB2E-2DFB35545FB3}"/>
+              </a:ext>
+            </a:extLst>
+          </p:cNvPr>
+          <p:cNvPicPr>
+            <a:picLocks noChangeAspect="1"/>
+          </p:cNvPicPr>
+          <p:nvPr/>
+        </p:nvPicPr>
+        <p:blipFill>
+          <a:blip r:embed="rId2">
+            <a:extLst>
+              <a:ext uri="{28A0092B-C50C-407E-A947-70E740481C1C}">
+                <a14:useLocalDpi xmlns:a14="http://schemas.microsoft.com/office/drawing/2010/main" val="0"/>
+              </a:ext>
+            </a:extLst>
+          </a:blip>
+          <a:stretch>
+            <a:fillRect/>
+          </a:stretch>
+        </p:blipFill>
+        <p:spPr>
+          <a:xfrm>
+            <a:off x="1" y="6148338"/>
+            <a:ext cx="6096000" cy="709662"/>
+          </a:xfrm>
+          <a:prstGeom prst="rect">
+            <a:avLst/>
+          </a:prstGeom>
+        </p:spPr>
+      </p:pic>
+      <p:pic>
+        <p:nvPicPr>
+          <p:cNvPr id="7" name="Picture 6" descr="A black text on a white background&#10;&#10;Description automatically generated">
+            <a:extLst>
+              <a:ext uri="{FF2B5EF4-FFF2-40B4-BE49-F238E27FC236}">
+                <a16:creationId xmlns:a16="http://schemas.microsoft.com/office/drawing/2014/main" id="{40F43B09-3572-415F-0AF0-173568846E3D}"/>
+              </a:ext>
+            </a:extLst>
+          </p:cNvPr>
+          <p:cNvPicPr>
+            <a:picLocks noChangeAspect="1"/>
+          </p:cNvPicPr>
+          <p:nvPr/>
+        </p:nvPicPr>
+        <p:blipFill>
+          <a:blip r:embed="rId3">
+            <a:extLst>
+              <a:ext uri="{28A0092B-C50C-407E-A947-70E740481C1C}">
+                <a14:useLocalDpi xmlns:a14="http://schemas.microsoft.com/office/drawing/2010/main" val="0"/>
+              </a:ext>
+            </a:extLst>
+          </a:blip>
+          <a:stretch>
+            <a:fillRect/>
+          </a:stretch>
+        </p:blipFill>
+        <p:spPr>
+          <a:xfrm>
+            <a:off x="6096000" y="4775201"/>
+            <a:ext cx="6096000" cy="2082799"/>
+          </a:xfrm>
+          <a:prstGeom prst="rect">
+            <a:avLst/>
+          </a:prstGeom>
+        </p:spPr>
+      </p:pic>
     </p:spTree>
     <p:extLst>
       <p:ext uri="{BB962C8B-B14F-4D97-AF65-F5344CB8AC3E}">
@@ -6012,11 +5884,11 @@
               <a:t>Using </a:t>
             </a:r>
             <a:r>
-              <a:rPr lang="en-US" dirty="0" err="1"/>
+              <a:rPr lang="en-US" b="1" i="1" dirty="0" err="1"/>
               <a:t>Object.values</a:t>
             </a:r>
             <a:r>
-              <a:rPr lang="en-US" dirty="0"/>
+              <a:rPr lang="en-US" b="1" i="1" dirty="0"/>
               <a:t>()</a:t>
             </a:r>
           </a:p>
@@ -6157,11 +6029,11 @@
               <a:t>Using </a:t>
             </a:r>
             <a:r>
-              <a:rPr lang="en-US" dirty="0" err="1"/>
+              <a:rPr lang="en-US" b="1" i="1" dirty="0" err="1"/>
               <a:t>JSON.stringify</a:t>
             </a:r>
             <a:r>
-              <a:rPr lang="en-US" dirty="0"/>
+              <a:rPr lang="en-US" b="1" i="1" dirty="0"/>
               <a:t>()</a:t>
             </a:r>
           </a:p>
@@ -6435,11 +6307,11 @@
               <a:t>Using </a:t>
             </a:r>
             <a:r>
-              <a:rPr lang="en-US" dirty="0" err="1"/>
+              <a:rPr lang="en-US" b="1" i="1" dirty="0" err="1"/>
               <a:t>JSON.stringify</a:t>
             </a:r>
             <a:r>
-              <a:rPr lang="en-US" dirty="0"/>
+              <a:rPr lang="en-US" b="1" i="1" dirty="0"/>
               <a:t>()</a:t>
             </a:r>
           </a:p>
@@ -6635,6 +6507,42 @@
           </a:p>
         </p:txBody>
       </p:sp>
+      <p:pic>
+        <p:nvPicPr>
+          <p:cNvPr id="5" name="Picture 4" descr="A computer screen shot of a program code&#10;&#10;Description automatically generated">
+            <a:extLst>
+              <a:ext uri="{FF2B5EF4-FFF2-40B4-BE49-F238E27FC236}">
+                <a16:creationId xmlns:a16="http://schemas.microsoft.com/office/drawing/2014/main" id="{221AC24D-7903-A4A6-A815-1EC6ABA7352C}"/>
+              </a:ext>
+            </a:extLst>
+          </p:cNvPr>
+          <p:cNvPicPr>
+            <a:picLocks noChangeAspect="1"/>
+          </p:cNvPicPr>
+          <p:nvPr/>
+        </p:nvPicPr>
+        <p:blipFill>
+          <a:blip r:embed="rId2">
+            <a:extLst>
+              <a:ext uri="{28A0092B-C50C-407E-A947-70E740481C1C}">
+                <a14:useLocalDpi xmlns:a14="http://schemas.microsoft.com/office/drawing/2010/main" val="0"/>
+              </a:ext>
+            </a:extLst>
+          </a:blip>
+          <a:stretch>
+            <a:fillRect/>
+          </a:stretch>
+        </p:blipFill>
+        <p:spPr>
+          <a:xfrm>
+            <a:off x="1898072" y="3911897"/>
+            <a:ext cx="8395855" cy="2946103"/>
+          </a:xfrm>
+          <a:prstGeom prst="rect">
+            <a:avLst/>
+          </a:prstGeom>
+        </p:spPr>
+      </p:pic>
     </p:spTree>
     <p:extLst>
       <p:ext uri="{BB962C8B-B14F-4D97-AF65-F5344CB8AC3E}">
@@ -6845,8 +6753,8 @@
         </p:blipFill>
         <p:spPr>
           <a:xfrm>
-            <a:off x="6872779" y="4510837"/>
-            <a:ext cx="5319221" cy="2347163"/>
+            <a:off x="6096001" y="4168075"/>
+            <a:ext cx="6096000" cy="2689925"/>
           </a:xfrm>
           <a:prstGeom prst="rect">
             <a:avLst/>
@@ -7894,13 +7802,7 @@
           <a:p>
             <a:r>
               <a:rPr lang="en-US" dirty="0"/>
-              <a:t>Most data types have a built in constructor to create an Object version of that type</a:t>
-            </a:r>
-          </a:p>
-          <a:p>
-            <a:r>
-              <a:rPr lang="en-US" dirty="0"/>
-              <a:t>Ex: new Object()</a:t>
+              <a:t>Most data types have a built-in constructor to create an Object version of that type</a:t>
             </a:r>
           </a:p>
           <a:p>
@@ -7908,6 +7810,42 @@
           </a:p>
         </p:txBody>
       </p:sp>
+      <p:pic>
+        <p:nvPicPr>
+          <p:cNvPr id="5" name="Picture 4" descr="A black screen with white text&#10;&#10;Description automatically generated">
+            <a:extLst>
+              <a:ext uri="{FF2B5EF4-FFF2-40B4-BE49-F238E27FC236}">
+                <a16:creationId xmlns:a16="http://schemas.microsoft.com/office/drawing/2014/main" id="{B073B253-0D2B-B087-B0E9-A1CC6E347359}"/>
+              </a:ext>
+            </a:extLst>
+          </p:cNvPr>
+          <p:cNvPicPr>
+            <a:picLocks noChangeAspect="1"/>
+          </p:cNvPicPr>
+          <p:nvPr/>
+        </p:nvPicPr>
+        <p:blipFill>
+          <a:blip r:embed="rId2">
+            <a:extLst>
+              <a:ext uri="{28A0092B-C50C-407E-A947-70E740481C1C}">
+                <a14:useLocalDpi xmlns:a14="http://schemas.microsoft.com/office/drawing/2010/main" val="0"/>
+              </a:ext>
+            </a:extLst>
+          </a:blip>
+          <a:stretch>
+            <a:fillRect/>
+          </a:stretch>
+        </p:blipFill>
+        <p:spPr>
+          <a:xfrm>
+            <a:off x="0" y="4387321"/>
+            <a:ext cx="12192000" cy="2470680"/>
+          </a:xfrm>
+          <a:prstGeom prst="rect">
+            <a:avLst/>
+          </a:prstGeom>
+        </p:spPr>
+      </p:pic>
     </p:spTree>
     <p:extLst>
       <p:ext uri="{BB962C8B-B14F-4D97-AF65-F5344CB8AC3E}">
@@ -8428,6 +8366,42 @@
           </a:p>
         </p:txBody>
       </p:sp>
+      <p:pic>
+        <p:nvPicPr>
+          <p:cNvPr id="7" name="Picture 6" descr="A screenshot of a computer program&#10;&#10;Description automatically generated">
+            <a:extLst>
+              <a:ext uri="{FF2B5EF4-FFF2-40B4-BE49-F238E27FC236}">
+                <a16:creationId xmlns:a16="http://schemas.microsoft.com/office/drawing/2014/main" id="{6E4C5F4D-F006-CFA2-5B63-5AB2428D7AA3}"/>
+              </a:ext>
+            </a:extLst>
+          </p:cNvPr>
+          <p:cNvPicPr>
+            <a:picLocks noChangeAspect="1"/>
+          </p:cNvPicPr>
+          <p:nvPr/>
+        </p:nvPicPr>
+        <p:blipFill>
+          <a:blip r:embed="rId2">
+            <a:extLst>
+              <a:ext uri="{28A0092B-C50C-407E-A947-70E740481C1C}">
+                <a14:useLocalDpi xmlns:a14="http://schemas.microsoft.com/office/drawing/2010/main" val="0"/>
+              </a:ext>
+            </a:extLst>
+          </a:blip>
+          <a:stretch>
+            <a:fillRect/>
+          </a:stretch>
+        </p:blipFill>
+        <p:spPr>
+          <a:xfrm>
+            <a:off x="8709891" y="2518759"/>
+            <a:ext cx="3482109" cy="4339242"/>
+          </a:xfrm>
+          <a:prstGeom prst="rect">
+            <a:avLst/>
+          </a:prstGeom>
+        </p:spPr>
+      </p:pic>
     </p:spTree>
     <p:extLst>
       <p:ext uri="{BB962C8B-B14F-4D97-AF65-F5344CB8AC3E}">
@@ -8532,6 +8506,42 @@
           </a:p>
         </p:txBody>
       </p:sp>
+      <p:pic>
+        <p:nvPicPr>
+          <p:cNvPr id="4" name="Picture 3" descr="A screen shot of a computer program&#10;&#10;Description automatically generated">
+            <a:extLst>
+              <a:ext uri="{FF2B5EF4-FFF2-40B4-BE49-F238E27FC236}">
+                <a16:creationId xmlns:a16="http://schemas.microsoft.com/office/drawing/2014/main" id="{B0716E07-701A-E764-6410-861E23135B5C}"/>
+              </a:ext>
+            </a:extLst>
+          </p:cNvPr>
+          <p:cNvPicPr>
+            <a:picLocks noChangeAspect="1"/>
+          </p:cNvPicPr>
+          <p:nvPr/>
+        </p:nvPicPr>
+        <p:blipFill>
+          <a:blip r:embed="rId2">
+            <a:extLst>
+              <a:ext uri="{28A0092B-C50C-407E-A947-70E740481C1C}">
+                <a14:useLocalDpi xmlns:a14="http://schemas.microsoft.com/office/drawing/2010/main" val="0"/>
+              </a:ext>
+            </a:extLst>
+          </a:blip>
+          <a:stretch>
+            <a:fillRect/>
+          </a:stretch>
+        </p:blipFill>
+        <p:spPr>
+          <a:xfrm>
+            <a:off x="8506691" y="3221287"/>
+            <a:ext cx="3685309" cy="3636713"/>
+          </a:xfrm>
+          <a:prstGeom prst="rect">
+            <a:avLst/>
+          </a:prstGeom>
+        </p:spPr>
+      </p:pic>
     </p:spTree>
     <p:extLst>
       <p:ext uri="{BB962C8B-B14F-4D97-AF65-F5344CB8AC3E}">
@@ -8892,15 +8902,7 @@
             </a:r>
             <a:r>
               <a:rPr lang="en-US" dirty="0"/>
-              <a:t> as well, like this: const </a:t>
-            </a:r>
-            <a:r>
-              <a:rPr lang="en-US" dirty="0" err="1"/>
-              <a:t>newObject</a:t>
-            </a:r>
-            <a:r>
-              <a:rPr lang="en-US" dirty="0"/>
-              <a:t> = new Object();</a:t>
+              <a:t> as well, like this:</a:t>
             </a:r>
           </a:p>
           <a:p>
@@ -8917,6 +8919,42 @@
           </a:p>
         </p:txBody>
       </p:sp>
+      <p:pic>
+        <p:nvPicPr>
+          <p:cNvPr id="5" name="Picture 4" descr="A screen shot of a computer program&#10;&#10;Description automatically generated">
+            <a:extLst>
+              <a:ext uri="{FF2B5EF4-FFF2-40B4-BE49-F238E27FC236}">
+                <a16:creationId xmlns:a16="http://schemas.microsoft.com/office/drawing/2014/main" id="{FCDC5975-09C5-A836-CABF-D9711099FAFD}"/>
+              </a:ext>
+            </a:extLst>
+          </p:cNvPr>
+          <p:cNvPicPr>
+            <a:picLocks noChangeAspect="1"/>
+          </p:cNvPicPr>
+          <p:nvPr/>
+        </p:nvPicPr>
+        <p:blipFill>
+          <a:blip r:embed="rId2">
+            <a:extLst>
+              <a:ext uri="{28A0092B-C50C-407E-A947-70E740481C1C}">
+                <a14:useLocalDpi xmlns:a14="http://schemas.microsoft.com/office/drawing/2010/main" val="0"/>
+              </a:ext>
+            </a:extLst>
+          </a:blip>
+          <a:stretch>
+            <a:fillRect/>
+          </a:stretch>
+        </p:blipFill>
+        <p:spPr>
+          <a:xfrm>
+            <a:off x="6964218" y="3422839"/>
+            <a:ext cx="5227782" cy="3435161"/>
+          </a:xfrm>
+          <a:prstGeom prst="rect">
+            <a:avLst/>
+          </a:prstGeom>
+        </p:spPr>
+      </p:pic>
     </p:spTree>
     <p:extLst>
       <p:ext uri="{BB962C8B-B14F-4D97-AF65-F5344CB8AC3E}">
@@ -8931,9 +8969,9 @@
 </file>
 
 <file path=ppt/theme/theme1.xml><?xml version="1.0" encoding="utf-8"?>
-<a:theme xmlns:a="http://schemas.openxmlformats.org/drawingml/2006/main" name="Gallery">
+<a:theme xmlns:a="http://schemas.openxmlformats.org/drawingml/2006/main" name="Office Theme">
   <a:themeElements>
-    <a:clrScheme name="Gallery">
+    <a:clrScheme name="Office">
       <a:dk1>
         <a:sysClr val="windowText" lastClr="000000"/>
       </a:dk1>
@@ -8941,39 +8979,39 @@
         <a:sysClr val="window" lastClr="FFFFFF"/>
       </a:lt1>
       <a:dk2>
-        <a:srgbClr val="454545"/>
+        <a:srgbClr val="44546A"/>
       </a:dk2>
       <a:lt2>
-        <a:srgbClr val="DFDBD5"/>
+        <a:srgbClr val="E7E6E6"/>
       </a:lt2>
       <a:accent1>
-        <a:srgbClr val="B71E42"/>
+        <a:srgbClr val="4472C4"/>
       </a:accent1>
       <a:accent2>
-        <a:srgbClr val="DE478E"/>
+        <a:srgbClr val="ED7D31"/>
       </a:accent2>
       <a:accent3>
-        <a:srgbClr val="BC72F0"/>
+        <a:srgbClr val="A5A5A5"/>
       </a:accent3>
       <a:accent4>
-        <a:srgbClr val="795FAF"/>
+        <a:srgbClr val="FFC000"/>
       </a:accent4>
       <a:accent5>
-        <a:srgbClr val="586EA6"/>
+        <a:srgbClr val="5B9BD5"/>
       </a:accent5>
       <a:accent6>
-        <a:srgbClr val="6892A0"/>
+        <a:srgbClr val="70AD47"/>
       </a:accent6>
       <a:hlink>
-        <a:srgbClr val="FA2B5C"/>
+        <a:srgbClr val="0563C1"/>
       </a:hlink>
       <a:folHlink>
-        <a:srgbClr val="BC658E"/>
+        <a:srgbClr val="954F72"/>
       </a:folHlink>
     </a:clrScheme>
-    <a:fontScheme name="Gallery">
+    <a:fontScheme name="Office">
       <a:majorFont>
-        <a:latin typeface="Gill Sans MT" panose="020B0502020104020203"/>
+        <a:latin typeface="Calibri Light" panose="020F0302020204030204"/>
         <a:ea typeface=""/>
         <a:cs typeface=""/>
         <a:font script="Jpan" typeface="游ゴシック Light"/>
@@ -9006,9 +9044,26 @@
         <a:font script="Viet" typeface="Times New Roman"/>
         <a:font script="Uigh" typeface="Microsoft Uighur"/>
         <a:font script="Geor" typeface="Sylfaen"/>
+        <a:font script="Armn" typeface="Arial"/>
+        <a:font script="Bugi" typeface="Leelawadee UI"/>
+        <a:font script="Bopo" typeface="Microsoft JhengHei"/>
+        <a:font script="Java" typeface="Javanese Text"/>
+        <a:font script="Lisu" typeface="Segoe UI"/>
+        <a:font script="Mymr" typeface="Myanmar Text"/>
+        <a:font script="Nkoo" typeface="Ebrima"/>
+        <a:font script="Olck" typeface="Nirmala UI"/>
+        <a:font script="Osma" typeface="Ebrima"/>
+        <a:font script="Phag" typeface="Phagspa"/>
+        <a:font script="Syrn" typeface="Estrangelo Edessa"/>
+        <a:font script="Syrj" typeface="Estrangelo Edessa"/>
+        <a:font script="Syre" typeface="Estrangelo Edessa"/>
+        <a:font script="Sora" typeface="Nirmala UI"/>
+        <a:font script="Tale" typeface="Microsoft Tai Le"/>
+        <a:font script="Talu" typeface="Microsoft New Tai Lue"/>
+        <a:font script="Tfng" typeface="Ebrima"/>
       </a:majorFont>
       <a:minorFont>
-        <a:latin typeface="Gill Sans MT" panose="020B0502020104020203"/>
+        <a:latin typeface="Calibri" panose="020F0502020204030204"/>
         <a:ea typeface=""/>
         <a:cs typeface=""/>
         <a:font script="Jpan" typeface="游ゴシック"/>
@@ -9041,9 +9096,26 @@
         <a:font script="Viet" typeface="Arial"/>
         <a:font script="Uigh" typeface="Microsoft Uighur"/>
         <a:font script="Geor" typeface="Sylfaen"/>
+        <a:font script="Armn" typeface="Arial"/>
+        <a:font script="Bugi" typeface="Leelawadee UI"/>
+        <a:font script="Bopo" typeface="Microsoft JhengHei"/>
+        <a:font script="Java" typeface="Javanese Text"/>
+        <a:font script="Lisu" typeface="Segoe UI"/>
+        <a:font script="Mymr" typeface="Myanmar Text"/>
+        <a:font script="Nkoo" typeface="Ebrima"/>
+        <a:font script="Olck" typeface="Nirmala UI"/>
+        <a:font script="Osma" typeface="Ebrima"/>
+        <a:font script="Phag" typeface="Phagspa"/>
+        <a:font script="Syrn" typeface="Estrangelo Edessa"/>
+        <a:font script="Syrj" typeface="Estrangelo Edessa"/>
+        <a:font script="Syre" typeface="Estrangelo Edessa"/>
+        <a:font script="Sora" typeface="Nirmala UI"/>
+        <a:font script="Tale" typeface="Microsoft Tai Le"/>
+        <a:font script="Talu" typeface="Microsoft New Tai Lue"/>
+        <a:font script="Tfng" typeface="Ebrima"/>
       </a:minorFont>
     </a:fontScheme>
-    <a:fmtScheme name="Gallery">
+    <a:fmtScheme name="Office">
       <a:fillStyleLst>
         <a:solidFill>
           <a:schemeClr val="phClr"/>
@@ -9052,18 +9124,23 @@
           <a:gsLst>
             <a:gs pos="0">
               <a:schemeClr val="phClr">
-                <a:tint val="54000"/>
-                <a:alpha val="100000"/>
+                <a:lumMod val="110000"/>
                 <a:satMod val="105000"/>
-                <a:lumMod val="110000"/>
+                <a:tint val="67000"/>
+              </a:schemeClr>
+            </a:gs>
+            <a:gs pos="50000">
+              <a:schemeClr val="phClr">
+                <a:lumMod val="105000"/>
+                <a:satMod val="103000"/>
+                <a:tint val="73000"/>
               </a:schemeClr>
             </a:gs>
             <a:gs pos="100000">
               <a:schemeClr val="phClr">
-                <a:tint val="78000"/>
-                <a:alpha val="92000"/>
+                <a:lumMod val="105000"/>
                 <a:satMod val="109000"/>
-                <a:lumMod val="100000"/>
+                <a:tint val="81000"/>
               </a:schemeClr>
             </a:gs>
           </a:gsLst>
@@ -9073,23 +9150,23 @@
           <a:gsLst>
             <a:gs pos="0">
               <a:schemeClr val="phClr">
-                <a:tint val="98000"/>
-                <a:satMod val="110000"/>
-                <a:lumMod val="104000"/>
+                <a:satMod val="103000"/>
+                <a:lumMod val="102000"/>
+                <a:tint val="94000"/>
               </a:schemeClr>
             </a:gs>
-            <a:gs pos="69000">
+            <a:gs pos="50000">
               <a:schemeClr val="phClr">
-                <a:shade val="88000"/>
-                <a:satMod val="130000"/>
-                <a:lumMod val="92000"/>
+                <a:satMod val="110000"/>
+                <a:lumMod val="100000"/>
+                <a:shade val="100000"/>
               </a:schemeClr>
             </a:gs>
             <a:gs pos="100000">
               <a:schemeClr val="phClr">
+                <a:lumMod val="99000"/>
+                <a:satMod val="120000"/>
                 <a:shade val="78000"/>
-                <a:satMod val="130000"/>
-                <a:lumMod val="92000"/>
               </a:schemeClr>
             </a:gs>
           </a:gsLst>
@@ -9097,23 +9174,26 @@
         </a:gradFill>
       </a:fillStyleLst>
       <a:lnStyleLst>
-        <a:ln w="9525" cap="flat" cmpd="sng" algn="ctr">
+        <a:ln w="6350" cap="flat" cmpd="sng" algn="ctr">
           <a:solidFill>
             <a:schemeClr val="phClr"/>
           </a:solidFill>
           <a:prstDash val="solid"/>
+          <a:miter lim="800000"/>
         </a:ln>
-        <a:ln w="15875" cap="flat" cmpd="sng" algn="ctr">
+        <a:ln w="12700" cap="flat" cmpd="sng" algn="ctr">
           <a:solidFill>
             <a:schemeClr val="phClr"/>
           </a:solidFill>
           <a:prstDash val="solid"/>
+          <a:miter lim="800000"/>
         </a:ln>
-        <a:ln w="22225" cap="flat" cmpd="sng" algn="ctr">
+        <a:ln w="19050" cap="flat" cmpd="sng" algn="ctr">
           <a:solidFill>
             <a:schemeClr val="phClr"/>
           </a:solidFill>
           <a:prstDash val="solid"/>
+          <a:miter lim="800000"/>
         </a:ln>
       </a:lnStyleLst>
       <a:effectStyleLst>
@@ -9125,23 +9205,12 @@
         </a:effectStyle>
         <a:effectStyle>
           <a:effectLst>
-            <a:outerShdw blurRad="50800" dist="50800" dir="5400000" sx="96000" sy="96000" rotWithShape="0">
+            <a:outerShdw blurRad="57150" dist="19050" dir="5400000" algn="ctr" rotWithShape="0">
               <a:srgbClr val="000000">
-                <a:alpha val="48000"/>
+                <a:alpha val="63000"/>
               </a:srgbClr>
             </a:outerShdw>
           </a:effectLst>
-          <a:scene3d>
-            <a:camera prst="orthographicFront">
-              <a:rot lat="0" lon="0" rev="0"/>
-            </a:camera>
-            <a:lightRig rig="balanced" dir="t">
-              <a:rot lat="0" lon="0" rev="1080000"/>
-            </a:lightRig>
-          </a:scene3d>
-          <a:sp3d>
-            <a:bevelT w="38100" h="12700" prst="softRound"/>
-          </a:sp3d>
         </a:effectStyle>
       </a:effectStyleLst>
       <a:bgFillStyleLst>
@@ -9149,26 +9218,37 @@
           <a:schemeClr val="phClr"/>
         </a:solidFill>
         <a:solidFill>
-          <a:schemeClr val="phClr"/>
+          <a:schemeClr val="phClr">
+            <a:tint val="95000"/>
+            <a:satMod val="170000"/>
+          </a:schemeClr>
         </a:solidFill>
         <a:gradFill rotWithShape="1">
           <a:gsLst>
             <a:gs pos="0">
               <a:schemeClr val="phClr">
-                <a:tint val="94000"/>
-                <a:satMod val="80000"/>
-                <a:lumMod val="106000"/>
+                <a:tint val="93000"/>
+                <a:satMod val="150000"/>
+                <a:shade val="98000"/>
+                <a:lumMod val="102000"/>
+              </a:schemeClr>
+            </a:gs>
+            <a:gs pos="50000">
+              <a:schemeClr val="phClr">
+                <a:tint val="98000"/>
+                <a:satMod val="130000"/>
+                <a:shade val="90000"/>
+                <a:lumMod val="103000"/>
               </a:schemeClr>
             </a:gs>
             <a:gs pos="100000">
               <a:schemeClr val="phClr">
-                <a:shade val="80000"/>
+                <a:shade val="63000"/>
+                <a:satMod val="120000"/>
               </a:schemeClr>
             </a:gs>
           </a:gsLst>
-          <a:path path="circle">
-            <a:fillToRect l="43000" r="43000" b="100000"/>
-          </a:path>
+          <a:lin ang="5400000" scaled="0"/>
         </a:gradFill>
       </a:bgFillStyleLst>
     </a:fmtScheme>
@@ -9177,7 +9257,7 @@
   <a:extraClrSchemeLst/>
   <a:extLst>
     <a:ext uri="{05A4C25C-085E-4340-85A3-A5531E510DB2}">
-      <thm15:themeFamily xmlns:thm15="http://schemas.microsoft.com/office/thememl/2012/main" name="Gallery" id="{BBFCD31E-59A1-489D-B089-A3EAD7CAE12E}" vid="{F5E91637-A7B6-4E27-B710-77DA7014EE1E}"/>
+      <thm15:themeFamily xmlns:thm15="http://schemas.microsoft.com/office/thememl/2012/main" name="Office Theme" id="{62F939B6-93AF-4DB8-9C6B-D6C7DFDC589F}" vid="{4A3C46E8-61CC-4603-A589-7422A47A8E4A}"/>
     </a:ext>
   </a:extLst>
 </a:theme>

</xml_diff>